<commit_message>
Planungskonzept bis Praesentation und Film
</commit_message>
<xml_diff>
--- a/Präsentationen/01 Planungsphase/Planungspraesentation_MeltemOezkul_MOE_51.pptx
+++ b/Präsentationen/01 Planungsphase/Planungspraesentation_MeltemOezkul_MOE_51.pptx
@@ -5,15 +5,23 @@
     <p:sldMasterId id="2147484051" r:id="rId1"/>
   </p:sldMasterIdLst>
   <p:notesMasterIdLst>
-    <p:notesMasterId r:id="rId8"/>
+    <p:notesMasterId r:id="rId16"/>
   </p:notesMasterIdLst>
   <p:sldIdLst>
     <p:sldId id="256" r:id="rId2"/>
     <p:sldId id="257" r:id="rId3"/>
     <p:sldId id="258" r:id="rId4"/>
-    <p:sldId id="259" r:id="rId5"/>
-    <p:sldId id="260" r:id="rId6"/>
-    <p:sldId id="261" r:id="rId7"/>
+    <p:sldId id="262" r:id="rId5"/>
+    <p:sldId id="263" r:id="rId6"/>
+    <p:sldId id="264" r:id="rId7"/>
+    <p:sldId id="265" r:id="rId8"/>
+    <p:sldId id="266" r:id="rId9"/>
+    <p:sldId id="267" r:id="rId10"/>
+    <p:sldId id="268" r:id="rId11"/>
+    <p:sldId id="269" r:id="rId12"/>
+    <p:sldId id="270" r:id="rId13"/>
+    <p:sldId id="260" r:id="rId14"/>
+    <p:sldId id="261" r:id="rId15"/>
   </p:sldIdLst>
   <p:sldSz cx="9144000" cy="6858000" type="screen4x3"/>
   <p:notesSz cx="6858000" cy="9144000"/>
@@ -197,7 +205,7 @@
           <a:p>
             <a:fld id="{7074DE81-99FF-944E-9C69-3A5EFC18925A}" type="datetimeFigureOut">
               <a:rPr lang="de-DE" smtClean="0"/>
-              <a:t>24.11.14</a:t>
+              <a:t>26.11.14</a:t>
             </a:fld>
             <a:endParaRPr lang="de-DE"/>
           </a:p>
@@ -887,7 +895,7 @@
           <a:p>
             <a:fld id="{2069C06D-4ED8-42C6-905D-CA84CA1B6CBF}" type="datetime2">
               <a:rPr lang="en-US" smtClean="0"/>
-              <a:t>Montag, 24. November 14</a:t>
+              <a:t>Mittwoch, 26. November 14</a:t>
             </a:fld>
             <a:endParaRPr lang="en-US" dirty="0"/>
           </a:p>
@@ -1099,7 +1107,7 @@
           <a:p>
             <a:fld id="{BF6703E8-CF71-8F4B-8B4E-92ADC2BF80FD}" type="datetimeFigureOut">
               <a:rPr lang="de-DE" smtClean="0"/>
-              <a:t>24.11.14</a:t>
+              <a:t>26.11.14</a:t>
             </a:fld>
             <a:endParaRPr lang="de-DE"/>
           </a:p>
@@ -1286,7 +1294,7 @@
           <a:p>
             <a:fld id="{BF6703E8-CF71-8F4B-8B4E-92ADC2BF80FD}" type="datetimeFigureOut">
               <a:rPr lang="de-DE" smtClean="0"/>
-              <a:t>24.11.14</a:t>
+              <a:t>26.11.14</a:t>
             </a:fld>
             <a:endParaRPr lang="de-DE"/>
           </a:p>
@@ -1383,7 +1391,7 @@
           <a:p>
             <a:fld id="{BF6703E8-CF71-8F4B-8B4E-92ADC2BF80FD}" type="datetimeFigureOut">
               <a:rPr lang="de-DE" smtClean="0"/>
-              <a:t>24.11.14</a:t>
+              <a:t>26.11.14</a:t>
             </a:fld>
             <a:endParaRPr lang="de-DE"/>
           </a:p>
@@ -1979,7 +1987,7 @@
           <a:p>
             <a:fld id="{3AD8CDC4-3D19-4983-B478-82F6B8E5AB66}" type="datetime2">
               <a:rPr lang="en-US" smtClean="0"/>
-              <a:t>Montag, 24. November 14</a:t>
+              <a:t>Mittwoch, 26. November 14</a:t>
             </a:fld>
             <a:endParaRPr lang="en-US" dirty="0"/>
           </a:p>
@@ -2076,7 +2084,7 @@
           <a:p>
             <a:fld id="{BF6703E8-CF71-8F4B-8B4E-92ADC2BF80FD}" type="datetimeFigureOut">
               <a:rPr lang="de-DE" smtClean="0"/>
-              <a:t>24.11.14</a:t>
+              <a:t>26.11.14</a:t>
             </a:fld>
             <a:endParaRPr lang="de-DE"/>
           </a:p>
@@ -2681,7 +2689,7 @@
           <a:p>
             <a:fld id="{BF6703E8-CF71-8F4B-8B4E-92ADC2BF80FD}" type="datetimeFigureOut">
               <a:rPr lang="de-DE" smtClean="0"/>
-              <a:t>24.11.14</a:t>
+              <a:t>26.11.14</a:t>
             </a:fld>
             <a:endParaRPr lang="de-DE"/>
           </a:p>
@@ -2824,7 +2832,7 @@
           <a:p>
             <a:fld id="{BF6703E8-CF71-8F4B-8B4E-92ADC2BF80FD}" type="datetimeFigureOut">
               <a:rPr lang="de-DE" smtClean="0"/>
-              <a:t>24.11.14</a:t>
+              <a:t>26.11.14</a:t>
             </a:fld>
             <a:endParaRPr lang="de-DE"/>
           </a:p>
@@ -2921,7 +2929,7 @@
           <a:p>
             <a:fld id="{BF6703E8-CF71-8F4B-8B4E-92ADC2BF80FD}" type="datetimeFigureOut">
               <a:rPr lang="de-DE" smtClean="0"/>
-              <a:t>24.11.14</a:t>
+              <a:t>26.11.14</a:t>
             </a:fld>
             <a:endParaRPr lang="de-DE"/>
           </a:p>
@@ -3205,7 +3213,7 @@
           <a:p>
             <a:fld id="{BF6703E8-CF71-8F4B-8B4E-92ADC2BF80FD}" type="datetimeFigureOut">
               <a:rPr lang="de-DE" smtClean="0"/>
-              <a:t>24.11.14</a:t>
+              <a:t>26.11.14</a:t>
             </a:fld>
             <a:endParaRPr lang="de-DE"/>
           </a:p>
@@ -3727,7 +3735,7 @@
           <a:p>
             <a:fld id="{BF6703E8-CF71-8F4B-8B4E-92ADC2BF80FD}" type="datetimeFigureOut">
               <a:rPr lang="de-DE" smtClean="0"/>
-              <a:t>24.11.14</a:t>
+              <a:t>26.11.14</a:t>
             </a:fld>
             <a:endParaRPr lang="de-DE"/>
           </a:p>
@@ -4247,7 +4255,7 @@
           <a:p>
             <a:fld id="{BF6703E8-CF71-8F4B-8B4E-92ADC2BF80FD}" type="datetimeFigureOut">
               <a:rPr lang="de-DE" smtClean="0"/>
-              <a:t>24.11.14</a:t>
+              <a:t>26.11.14</a:t>
             </a:fld>
             <a:endParaRPr lang="de-DE"/>
           </a:p>
@@ -4860,11 +4868,7 @@
             <a:pPr lvl="1" algn="l"/>
             <a:r>
               <a:rPr lang="de-DE" sz="1800" dirty="0" smtClean="0"/>
-              <a:t>Matrikel-</a:t>
-            </a:r>
-            <a:r>
-              <a:rPr lang="de-DE" sz="1800" dirty="0" smtClean="0"/>
-              <a:t>Nr.: 729792</a:t>
+              <a:t>Matrikel-Nr.: 729792</a:t>
             </a:r>
           </a:p>
           <a:p>
@@ -4961,14 +4965,713 @@
   <p:clrMapOvr>
     <a:masterClrMapping/>
   </p:clrMapOvr>
-  <mc:AlternateContent xmlns:mc="http://schemas.openxmlformats.org/markup-compatibility/2006">
-    <mc:Choice xmlns:p14="http://schemas.microsoft.com/office/powerpoint/2010/main" Requires="p14">
+  <mc:AlternateContent xmlns:mc="http://schemas.openxmlformats.org/markup-compatibility/2006" xmlns:p14="http://schemas.microsoft.com/office/powerpoint/2010/main">
+    <mc:Choice Requires="p14">
       <p:transition spd="slow" p14:dur="2000"/>
     </mc:Choice>
-    <mc:Fallback>
+    <mc:Fallback xmlns="">
       <p:transition xmlns:p14="http://schemas.microsoft.com/office/powerpoint/2010/main" spd="slow"/>
     </mc:Fallback>
   </mc:AlternateContent>
+  <p:timing>
+    <p:tnLst>
+      <p:par>
+        <p:cTn xmlns:p14="http://schemas.microsoft.com/office/powerpoint/2010/main" id="1" dur="indefinite" restart="never" nodeType="tmRoot"/>
+      </p:par>
+    </p:tnLst>
+  </p:timing>
+</p:sld>
+</file>
+
+<file path=ppt/slides/slide10.xml><?xml version="1.0" encoding="utf-8"?>
+<p:sld xmlns:a="http://schemas.openxmlformats.org/drawingml/2006/main" xmlns:r="http://schemas.openxmlformats.org/officeDocument/2006/relationships" xmlns:p="http://schemas.openxmlformats.org/presentationml/2006/main">
+  <p:cSld>
+    <p:spTree>
+      <p:nvGrpSpPr>
+        <p:cNvPr id="1" name=""/>
+        <p:cNvGrpSpPr/>
+        <p:nvPr/>
+      </p:nvGrpSpPr>
+      <p:grpSpPr>
+        <a:xfrm>
+          <a:off x="0" y="0"/>
+          <a:ext cx="0" cy="0"/>
+          <a:chOff x="0" y="0"/>
+          <a:chExt cx="0" cy="0"/>
+        </a:xfrm>
+      </p:grpSpPr>
+      <p:sp>
+        <p:nvSpPr>
+          <p:cNvPr id="2" name="Titel 1"/>
+          <p:cNvSpPr>
+            <a:spLocks noGrp="1"/>
+          </p:cNvSpPr>
+          <p:nvPr>
+            <p:ph type="title"/>
+          </p:nvPr>
+        </p:nvSpPr>
+        <p:spPr>
+          <a:xfrm>
+            <a:off x="1344268" y="280137"/>
+            <a:ext cx="6512511" cy="1143000"/>
+          </a:xfrm>
+        </p:spPr>
+        <p:txBody>
+          <a:bodyPr/>
+          <a:lstStyle/>
+          <a:p>
+            <a:pPr marL="0" indent="0" algn="ctr">
+              <a:buNone/>
+            </a:pPr>
+            <a:r>
+              <a:rPr lang="de-DE" dirty="0" smtClean="0"/>
+              <a:t>Storyboard</a:t>
+            </a:r>
+            <a:endParaRPr lang="de-DE" dirty="0"/>
+          </a:p>
+        </p:txBody>
+      </p:sp>
+      <p:sp>
+        <p:nvSpPr>
+          <p:cNvPr id="3" name="Inhaltsplatzhalter 2"/>
+          <p:cNvSpPr>
+            <a:spLocks noGrp="1"/>
+          </p:cNvSpPr>
+          <p:nvPr>
+            <p:ph sz="quarter" idx="13"/>
+          </p:nvPr>
+        </p:nvSpPr>
+        <p:spPr>
+          <a:xfrm>
+            <a:off x="5323585" y="2104425"/>
+            <a:ext cx="3377910" cy="3474720"/>
+          </a:xfrm>
+        </p:spPr>
+        <p:txBody>
+          <a:bodyPr>
+            <a:normAutofit/>
+          </a:bodyPr>
+          <a:lstStyle/>
+          <a:p>
+            <a:pPr marL="45720" indent="0">
+              <a:buNone/>
+            </a:pPr>
+            <a:r>
+              <a:rPr lang="de-DE" dirty="0"/>
+              <a:t>Szene </a:t>
+            </a:r>
+            <a:r>
+              <a:rPr lang="de-DE" dirty="0" smtClean="0"/>
+              <a:t>8</a:t>
+            </a:r>
+          </a:p>
+          <a:p>
+            <a:pPr marL="45720" indent="0">
+              <a:buNone/>
+            </a:pPr>
+            <a:r>
+              <a:rPr lang="de-DE" dirty="0"/>
+              <a:t>Yoko klammert sich an die Banane</a:t>
+            </a:r>
+          </a:p>
+          <a:p>
+            <a:pPr marL="45720" indent="0">
+              <a:buNone/>
+            </a:pPr>
+            <a:r>
+              <a:rPr lang="de-DE" dirty="0"/>
+              <a:t>und hält sie felsenfest in seiner Hand!</a:t>
+            </a:r>
+          </a:p>
+          <a:p>
+            <a:pPr marL="45720" indent="0">
+              <a:buNone/>
+            </a:pPr>
+            <a:endParaRPr lang="de-DE" dirty="0"/>
+          </a:p>
+        </p:txBody>
+      </p:sp>
+      <p:pic>
+        <p:nvPicPr>
+          <p:cNvPr id="4" name="Bild 3" descr="Bild8.jpg"/>
+          <p:cNvPicPr>
+            <a:picLocks noChangeAspect="1"/>
+          </p:cNvPicPr>
+          <p:nvPr/>
+        </p:nvPicPr>
+        <p:blipFill>
+          <a:blip r:embed="rId2">
+            <a:extLst>
+              <a:ext uri="{28A0092B-C50C-407E-A947-70E740481C1C}">
+                <a14:useLocalDpi xmlns:a14="http://schemas.microsoft.com/office/drawing/2010/main" val="0"/>
+              </a:ext>
+            </a:extLst>
+          </a:blip>
+          <a:stretch>
+            <a:fillRect/>
+          </a:stretch>
+        </p:blipFill>
+        <p:spPr>
+          <a:xfrm>
+            <a:off x="1432234" y="2104425"/>
+            <a:ext cx="3891351" cy="2664595"/>
+          </a:xfrm>
+          <a:prstGeom prst="rect">
+            <a:avLst/>
+          </a:prstGeom>
+        </p:spPr>
+      </p:pic>
+    </p:spTree>
+    <p:extLst>
+      <p:ext uri="{BB962C8B-B14F-4D97-AF65-F5344CB8AC3E}">
+        <p14:creationId xmlns:p14="http://schemas.microsoft.com/office/powerpoint/2010/main" val="3067745201"/>
+      </p:ext>
+    </p:extLst>
+  </p:cSld>
+  <p:clrMapOvr>
+    <a:masterClrMapping/>
+  </p:clrMapOvr>
+  <mc:AlternateContent xmlns:mc="http://schemas.openxmlformats.org/markup-compatibility/2006" xmlns:p14="http://schemas.microsoft.com/office/powerpoint/2010/main">
+    <mc:Choice Requires="p14">
+      <p:transition spd="slow" p14:dur="2000"/>
+    </mc:Choice>
+    <mc:Fallback xmlns="">
+      <p:transition xmlns:p14="http://schemas.microsoft.com/office/powerpoint/2010/main" spd="slow"/>
+    </mc:Fallback>
+  </mc:AlternateContent>
+</p:sld>
+</file>
+
+<file path=ppt/slides/slide11.xml><?xml version="1.0" encoding="utf-8"?>
+<p:sld xmlns:a="http://schemas.openxmlformats.org/drawingml/2006/main" xmlns:r="http://schemas.openxmlformats.org/officeDocument/2006/relationships" xmlns:p="http://schemas.openxmlformats.org/presentationml/2006/main">
+  <p:cSld>
+    <p:spTree>
+      <p:nvGrpSpPr>
+        <p:cNvPr id="1" name=""/>
+        <p:cNvGrpSpPr/>
+        <p:nvPr/>
+      </p:nvGrpSpPr>
+      <p:grpSpPr>
+        <a:xfrm>
+          <a:off x="0" y="0"/>
+          <a:ext cx="0" cy="0"/>
+          <a:chOff x="0" y="0"/>
+          <a:chExt cx="0" cy="0"/>
+        </a:xfrm>
+      </p:grpSpPr>
+      <p:sp>
+        <p:nvSpPr>
+          <p:cNvPr id="2" name="Titel 1"/>
+          <p:cNvSpPr>
+            <a:spLocks noGrp="1"/>
+          </p:cNvSpPr>
+          <p:nvPr>
+            <p:ph type="title"/>
+          </p:nvPr>
+        </p:nvSpPr>
+        <p:spPr>
+          <a:xfrm>
+            <a:off x="1344268" y="280137"/>
+            <a:ext cx="6512511" cy="1143000"/>
+          </a:xfrm>
+        </p:spPr>
+        <p:txBody>
+          <a:bodyPr/>
+          <a:lstStyle/>
+          <a:p>
+            <a:pPr marL="0" indent="0" algn="ctr">
+              <a:buNone/>
+            </a:pPr>
+            <a:r>
+              <a:rPr lang="de-DE" dirty="0" smtClean="0"/>
+              <a:t>Storyboard</a:t>
+            </a:r>
+            <a:endParaRPr lang="de-DE" dirty="0"/>
+          </a:p>
+        </p:txBody>
+      </p:sp>
+      <p:sp>
+        <p:nvSpPr>
+          <p:cNvPr id="3" name="Inhaltsplatzhalter 2"/>
+          <p:cNvSpPr>
+            <a:spLocks noGrp="1"/>
+          </p:cNvSpPr>
+          <p:nvPr>
+            <p:ph sz="quarter" idx="13"/>
+          </p:nvPr>
+        </p:nvSpPr>
+        <p:spPr>
+          <a:xfrm>
+            <a:off x="5323585" y="2104425"/>
+            <a:ext cx="3377910" cy="3474720"/>
+          </a:xfrm>
+        </p:spPr>
+        <p:txBody>
+          <a:bodyPr>
+            <a:normAutofit/>
+          </a:bodyPr>
+          <a:lstStyle/>
+          <a:p>
+            <a:pPr marL="45720" indent="0">
+              <a:buNone/>
+            </a:pPr>
+            <a:r>
+              <a:rPr lang="de-DE" dirty="0"/>
+              <a:t>Szene </a:t>
+            </a:r>
+            <a:r>
+              <a:rPr lang="de-DE" dirty="0" smtClean="0"/>
+              <a:t>9</a:t>
+            </a:r>
+          </a:p>
+          <a:p>
+            <a:pPr marL="45720" indent="0">
+              <a:buNone/>
+            </a:pPr>
+            <a:r>
+              <a:rPr lang="de-DE" dirty="0"/>
+              <a:t>Dem kleinen Affen ist nichts von </a:t>
+            </a:r>
+          </a:p>
+          <a:p>
+            <a:pPr marL="45720" indent="0">
+              <a:buNone/>
+            </a:pPr>
+            <a:r>
+              <a:rPr lang="de-DE" dirty="0"/>
+              <a:t>seiner Unsicherheit mehr </a:t>
+            </a:r>
+          </a:p>
+          <a:p>
+            <a:pPr marL="45720" indent="0">
+              <a:buNone/>
+            </a:pPr>
+            <a:r>
+              <a:rPr lang="de-DE" dirty="0"/>
+              <a:t>anzumerken. Er springt vor Freude </a:t>
+            </a:r>
+          </a:p>
+          <a:p>
+            <a:pPr marL="45720" indent="0">
+              <a:buNone/>
+            </a:pPr>
+            <a:r>
+              <a:rPr lang="de-DE" dirty="0"/>
+              <a:t>in die Luft. </a:t>
+            </a:r>
+          </a:p>
+        </p:txBody>
+      </p:sp>
+      <p:pic>
+        <p:nvPicPr>
+          <p:cNvPr id="4" name="Bild 3" descr="Bild9.jpg"/>
+          <p:cNvPicPr>
+            <a:picLocks noChangeAspect="1"/>
+          </p:cNvPicPr>
+          <p:nvPr/>
+        </p:nvPicPr>
+        <p:blipFill>
+          <a:blip r:embed="rId2">
+            <a:extLst>
+              <a:ext uri="{28A0092B-C50C-407E-A947-70E740481C1C}">
+                <a14:useLocalDpi xmlns:a14="http://schemas.microsoft.com/office/drawing/2010/main" val="0"/>
+              </a:ext>
+            </a:extLst>
+          </a:blip>
+          <a:stretch>
+            <a:fillRect/>
+          </a:stretch>
+        </p:blipFill>
+        <p:spPr>
+          <a:xfrm>
+            <a:off x="1499792" y="2242656"/>
+            <a:ext cx="3621119" cy="2694464"/>
+          </a:xfrm>
+          <a:prstGeom prst="rect">
+            <a:avLst/>
+          </a:prstGeom>
+        </p:spPr>
+      </p:pic>
+    </p:spTree>
+    <p:extLst>
+      <p:ext uri="{BB962C8B-B14F-4D97-AF65-F5344CB8AC3E}">
+        <p14:creationId xmlns:p14="http://schemas.microsoft.com/office/powerpoint/2010/main" val="2466855743"/>
+      </p:ext>
+    </p:extLst>
+  </p:cSld>
+  <p:clrMapOvr>
+    <a:masterClrMapping/>
+  </p:clrMapOvr>
+  <mc:AlternateContent xmlns:mc="http://schemas.openxmlformats.org/markup-compatibility/2006" xmlns:p14="http://schemas.microsoft.com/office/powerpoint/2010/main">
+    <mc:Choice Requires="p14">
+      <p:transition spd="slow" p14:dur="2000"/>
+    </mc:Choice>
+    <mc:Fallback xmlns="">
+      <p:transition xmlns:p14="http://schemas.microsoft.com/office/powerpoint/2010/main" spd="slow"/>
+    </mc:Fallback>
+  </mc:AlternateContent>
+</p:sld>
+</file>
+
+<file path=ppt/slides/slide12.xml><?xml version="1.0" encoding="utf-8"?>
+<p:sld xmlns:a="http://schemas.openxmlformats.org/drawingml/2006/main" xmlns:r="http://schemas.openxmlformats.org/officeDocument/2006/relationships" xmlns:p="http://schemas.openxmlformats.org/presentationml/2006/main">
+  <p:cSld>
+    <p:spTree>
+      <p:nvGrpSpPr>
+        <p:cNvPr id="1" name=""/>
+        <p:cNvGrpSpPr/>
+        <p:nvPr/>
+      </p:nvGrpSpPr>
+      <p:grpSpPr>
+        <a:xfrm>
+          <a:off x="0" y="0"/>
+          <a:ext cx="0" cy="0"/>
+          <a:chOff x="0" y="0"/>
+          <a:chExt cx="0" cy="0"/>
+        </a:xfrm>
+      </p:grpSpPr>
+      <p:sp>
+        <p:nvSpPr>
+          <p:cNvPr id="2" name="Titel 1"/>
+          <p:cNvSpPr>
+            <a:spLocks noGrp="1"/>
+          </p:cNvSpPr>
+          <p:nvPr>
+            <p:ph type="title"/>
+          </p:nvPr>
+        </p:nvSpPr>
+        <p:spPr>
+          <a:xfrm>
+            <a:off x="1344268" y="280137"/>
+            <a:ext cx="6512511" cy="1143000"/>
+          </a:xfrm>
+        </p:spPr>
+        <p:txBody>
+          <a:bodyPr/>
+          <a:lstStyle/>
+          <a:p>
+            <a:pPr marL="0" indent="0" algn="ctr">
+              <a:buNone/>
+            </a:pPr>
+            <a:r>
+              <a:rPr lang="de-DE" dirty="0" smtClean="0"/>
+              <a:t>Storyboard</a:t>
+            </a:r>
+            <a:endParaRPr lang="de-DE" dirty="0"/>
+          </a:p>
+        </p:txBody>
+      </p:sp>
+      <p:sp>
+        <p:nvSpPr>
+          <p:cNvPr id="3" name="Inhaltsplatzhalter 2"/>
+          <p:cNvSpPr>
+            <a:spLocks noGrp="1"/>
+          </p:cNvSpPr>
+          <p:nvPr>
+            <p:ph sz="quarter" idx="13"/>
+          </p:nvPr>
+        </p:nvSpPr>
+        <p:spPr>
+          <a:xfrm>
+            <a:off x="5323585" y="2104425"/>
+            <a:ext cx="3377910" cy="3474720"/>
+          </a:xfrm>
+        </p:spPr>
+        <p:txBody>
+          <a:bodyPr>
+            <a:normAutofit/>
+          </a:bodyPr>
+          <a:lstStyle/>
+          <a:p>
+            <a:pPr marL="45720" indent="0">
+              <a:buNone/>
+            </a:pPr>
+            <a:r>
+              <a:rPr lang="de-DE" dirty="0"/>
+              <a:t>Szene </a:t>
+            </a:r>
+            <a:r>
+              <a:rPr lang="de-DE" dirty="0" smtClean="0"/>
+              <a:t>10</a:t>
+            </a:r>
+          </a:p>
+          <a:p>
+            <a:pPr marL="45720" indent="0">
+              <a:buNone/>
+            </a:pPr>
+            <a:r>
+              <a:rPr lang="de-DE" dirty="0"/>
+              <a:t>So lebte Yoko bis an sein Lebensende, </a:t>
+            </a:r>
+          </a:p>
+          <a:p>
+            <a:pPr marL="45720" indent="0">
+              <a:buNone/>
+            </a:pPr>
+            <a:r>
+              <a:rPr lang="de-DE" dirty="0"/>
+              <a:t>voller Glück und Bananenlust, alleine</a:t>
+            </a:r>
+          </a:p>
+          <a:p>
+            <a:pPr marL="45720" indent="0">
+              <a:buNone/>
+            </a:pPr>
+            <a:r>
+              <a:rPr lang="de-DE" dirty="0"/>
+              <a:t>auf der Insel weiter :) </a:t>
+            </a:r>
+          </a:p>
+        </p:txBody>
+      </p:sp>
+      <p:pic>
+        <p:nvPicPr>
+          <p:cNvPr id="4" name="Bild 3" descr="Bild10.jpg"/>
+          <p:cNvPicPr>
+            <a:picLocks noChangeAspect="1"/>
+          </p:cNvPicPr>
+          <p:nvPr/>
+        </p:nvPicPr>
+        <p:blipFill>
+          <a:blip r:embed="rId2">
+            <a:extLst>
+              <a:ext uri="{28A0092B-C50C-407E-A947-70E740481C1C}">
+                <a14:useLocalDpi xmlns:a14="http://schemas.microsoft.com/office/drawing/2010/main" val="0"/>
+              </a:ext>
+            </a:extLst>
+          </a:blip>
+          <a:stretch>
+            <a:fillRect/>
+          </a:stretch>
+        </p:blipFill>
+        <p:spPr>
+          <a:xfrm>
+            <a:off x="1499791" y="2323716"/>
+            <a:ext cx="3823793" cy="2512855"/>
+          </a:xfrm>
+          <a:prstGeom prst="rect">
+            <a:avLst/>
+          </a:prstGeom>
+        </p:spPr>
+      </p:pic>
+    </p:spTree>
+    <p:extLst>
+      <p:ext uri="{BB962C8B-B14F-4D97-AF65-F5344CB8AC3E}">
+        <p14:creationId xmlns:p14="http://schemas.microsoft.com/office/powerpoint/2010/main" val="1278110788"/>
+      </p:ext>
+    </p:extLst>
+  </p:cSld>
+  <p:clrMapOvr>
+    <a:masterClrMapping/>
+  </p:clrMapOvr>
+  <mc:AlternateContent xmlns:mc="http://schemas.openxmlformats.org/markup-compatibility/2006" xmlns:p14="http://schemas.microsoft.com/office/powerpoint/2010/main">
+    <mc:Choice Requires="p14">
+      <p:transition spd="slow" p14:dur="2000"/>
+    </mc:Choice>
+    <mc:Fallback xmlns="">
+      <p:transition xmlns:p14="http://schemas.microsoft.com/office/powerpoint/2010/main" spd="slow"/>
+    </mc:Fallback>
+  </mc:AlternateContent>
+</p:sld>
+</file>
+
+<file path=ppt/slides/slide13.xml><?xml version="1.0" encoding="utf-8"?>
+<p:sld xmlns:a="http://schemas.openxmlformats.org/drawingml/2006/main" xmlns:r="http://schemas.openxmlformats.org/officeDocument/2006/relationships" xmlns:p="http://schemas.openxmlformats.org/presentationml/2006/main">
+  <p:cSld>
+    <p:spTree>
+      <p:nvGrpSpPr>
+        <p:cNvPr id="1" name=""/>
+        <p:cNvGrpSpPr/>
+        <p:nvPr/>
+      </p:nvGrpSpPr>
+      <p:grpSpPr>
+        <a:xfrm>
+          <a:off x="0" y="0"/>
+          <a:ext cx="0" cy="0"/>
+          <a:chOff x="0" y="0"/>
+          <a:chExt cx="0" cy="0"/>
+        </a:xfrm>
+      </p:grpSpPr>
+      <p:sp>
+        <p:nvSpPr>
+          <p:cNvPr id="2" name="Titel 1"/>
+          <p:cNvSpPr>
+            <a:spLocks noGrp="1"/>
+          </p:cNvSpPr>
+          <p:nvPr>
+            <p:ph type="title"/>
+          </p:nvPr>
+        </p:nvSpPr>
+        <p:spPr>
+          <a:xfrm>
+            <a:off x="1344268" y="280137"/>
+            <a:ext cx="6512511" cy="1143000"/>
+          </a:xfrm>
+        </p:spPr>
+        <p:txBody>
+          <a:bodyPr/>
+          <a:lstStyle/>
+          <a:p>
+            <a:pPr marL="0" indent="0" algn="ctr">
+              <a:buNone/>
+            </a:pPr>
+            <a:r>
+              <a:rPr lang="de-DE" dirty="0" smtClean="0"/>
+              <a:t>Sound-Quelle</a:t>
+            </a:r>
+            <a:endParaRPr lang="de-DE" dirty="0"/>
+          </a:p>
+        </p:txBody>
+      </p:sp>
+      <p:sp>
+        <p:nvSpPr>
+          <p:cNvPr id="3" name="Inhaltsplatzhalter 2"/>
+          <p:cNvSpPr>
+            <a:spLocks noGrp="1"/>
+          </p:cNvSpPr>
+          <p:nvPr>
+            <p:ph sz="quarter" idx="13"/>
+          </p:nvPr>
+        </p:nvSpPr>
+        <p:spPr>
+          <a:xfrm>
+            <a:off x="1455979" y="2104425"/>
+            <a:ext cx="6400800" cy="3474720"/>
+          </a:xfrm>
+        </p:spPr>
+        <p:txBody>
+          <a:bodyPr/>
+          <a:lstStyle/>
+          <a:p>
+            <a:r>
+              <a:rPr lang="de-DE" dirty="0" err="1"/>
+              <a:t>www.soundbible.com</a:t>
+            </a:r>
+            <a:endParaRPr lang="de-DE" dirty="0"/>
+          </a:p>
+          <a:p>
+            <a:r>
+              <a:rPr lang="de-DE" dirty="0" err="1"/>
+              <a:t>www.salamisound.de</a:t>
+            </a:r>
+            <a:endParaRPr lang="de-DE" dirty="0"/>
+          </a:p>
+          <a:p>
+            <a:r>
+              <a:rPr lang="de-DE" dirty="0" err="1"/>
+              <a:t>www.freesound.org</a:t>
+            </a:r>
+            <a:r>
+              <a:rPr lang="de-DE" dirty="0"/>
+              <a:t>/</a:t>
+            </a:r>
+            <a:endParaRPr lang="de-DE" dirty="0">
+              <a:effectLst/>
+            </a:endParaRPr>
+          </a:p>
+        </p:txBody>
+      </p:sp>
+    </p:spTree>
+    <p:extLst>
+      <p:ext uri="{BB962C8B-B14F-4D97-AF65-F5344CB8AC3E}">
+        <p14:creationId xmlns:p14="http://schemas.microsoft.com/office/powerpoint/2010/main" val="4275329949"/>
+      </p:ext>
+    </p:extLst>
+  </p:cSld>
+  <p:clrMapOvr>
+    <a:masterClrMapping/>
+  </p:clrMapOvr>
+  <mc:AlternateContent xmlns:mc="http://schemas.openxmlformats.org/markup-compatibility/2006" xmlns:p14="http://schemas.microsoft.com/office/powerpoint/2010/main">
+    <mc:Choice Requires="p14">
+      <p:transition spd="slow" p14:dur="2000"/>
+    </mc:Choice>
+    <mc:Fallback xmlns="">
+      <p:transition xmlns:p14="http://schemas.microsoft.com/office/powerpoint/2010/main" spd="slow"/>
+    </mc:Fallback>
+  </mc:AlternateContent>
+  <p:timing>
+    <p:tnLst>
+      <p:par>
+        <p:cTn xmlns:p14="http://schemas.microsoft.com/office/powerpoint/2010/main" id="1" dur="indefinite" restart="never" nodeType="tmRoot"/>
+      </p:par>
+    </p:tnLst>
+  </p:timing>
+</p:sld>
+</file>
+
+<file path=ppt/slides/slide14.xml><?xml version="1.0" encoding="utf-8"?>
+<p:sld xmlns:a="http://schemas.openxmlformats.org/drawingml/2006/main" xmlns:r="http://schemas.openxmlformats.org/officeDocument/2006/relationships" xmlns:p="http://schemas.openxmlformats.org/presentationml/2006/main">
+  <p:cSld>
+    <p:spTree>
+      <p:nvGrpSpPr>
+        <p:cNvPr id="1" name=""/>
+        <p:cNvGrpSpPr/>
+        <p:nvPr/>
+      </p:nvGrpSpPr>
+      <p:grpSpPr>
+        <a:xfrm>
+          <a:off x="0" y="0"/>
+          <a:ext cx="0" cy="0"/>
+          <a:chOff x="0" y="0"/>
+          <a:chExt cx="0" cy="0"/>
+        </a:xfrm>
+      </p:grpSpPr>
+      <p:pic>
+        <p:nvPicPr>
+          <p:cNvPr id="4" name="Inhaltsplatzhalter 3" descr="NeuLandschaft_0002.jpg"/>
+          <p:cNvPicPr>
+            <a:picLocks noGrp="1" noChangeAspect="1"/>
+          </p:cNvPicPr>
+          <p:nvPr>
+            <p:ph sz="quarter" idx="13"/>
+          </p:nvPr>
+        </p:nvPicPr>
+        <p:blipFill>
+          <a:blip r:embed="rId2">
+            <a:extLst>
+              <a:ext uri="{28A0092B-C50C-407E-A947-70E740481C1C}">
+                <a14:useLocalDpi xmlns:a14="http://schemas.microsoft.com/office/drawing/2010/main" val="0"/>
+              </a:ext>
+            </a:extLst>
+          </a:blip>
+          <a:srcRect t="13806" b="13806"/>
+          <a:stretch>
+            <a:fillRect/>
+          </a:stretch>
+        </p:blipFill>
+        <p:spPr>
+          <a:xfrm>
+            <a:off x="365145" y="216342"/>
+            <a:ext cx="8389760" cy="4554441"/>
+          </a:xfrm>
+          <a:prstGeom prst="roundRect">
+            <a:avLst>
+              <a:gd name="adj" fmla="val 8594"/>
+            </a:avLst>
+          </a:prstGeom>
+          <a:solidFill>
+            <a:srgbClr val="FFFFFF">
+              <a:shade val="85000"/>
+            </a:srgbClr>
+          </a:solidFill>
+          <a:ln>
+            <a:noFill/>
+          </a:ln>
+          <a:effectLst>
+            <a:reflection blurRad="12700" stA="38000" endPos="28000" dist="5000" dir="5400000" sy="-100000" algn="bl" rotWithShape="0"/>
+          </a:effectLst>
+        </p:spPr>
+      </p:pic>
+    </p:spTree>
+    <p:extLst>
+      <p:ext uri="{BB962C8B-B14F-4D97-AF65-F5344CB8AC3E}">
+        <p14:creationId xmlns:p14="http://schemas.microsoft.com/office/powerpoint/2010/main" val="2141247327"/>
+      </p:ext>
+    </p:extLst>
+  </p:cSld>
+  <p:clrMapOvr>
+    <a:masterClrMapping/>
+  </p:clrMapOvr>
   <p:timing>
     <p:tnLst>
       <p:par>
@@ -5039,14 +5742,73 @@
         </p:nvSpPr>
         <p:spPr>
           <a:xfrm>
-            <a:off x="1609928" y="1770562"/>
-            <a:ext cx="6400800" cy="3474720"/>
-          </a:xfrm>
-        </p:spPr>
-        <p:txBody>
-          <a:bodyPr/>
-          <a:lstStyle/>
-          <a:p>
+            <a:off x="1609928" y="1770561"/>
+            <a:ext cx="6497054" cy="3944157"/>
+          </a:xfrm>
+        </p:spPr>
+        <p:txBody>
+          <a:bodyPr>
+            <a:normAutofit fontScale="92500" lnSpcReduction="20000"/>
+          </a:bodyPr>
+          <a:lstStyle/>
+          <a:p>
+            <a:pPr marL="45720" indent="0">
+              <a:buNone/>
+            </a:pPr>
+            <a:r>
+              <a:rPr lang="de-DE" dirty="0"/>
+              <a:t>Der kleine Affe Yoko ist auf einer einsamen Insel. Er schaut vergeblich um sich herum. Weit und breit keine Artgenossen zu sehen. Lauter Verzweiflung schaute Yoko nach oben, Richtung Himmel. </a:t>
+            </a:r>
+            <a:endParaRPr lang="de-DE" dirty="0" smtClean="0"/>
+          </a:p>
+          <a:p>
+            <a:pPr marL="45720" indent="0">
+              <a:buNone/>
+            </a:pPr>
+            <a:endParaRPr lang="de-DE" dirty="0"/>
+          </a:p>
+          <a:p>
+            <a:pPr marL="45720" indent="0">
+              <a:buNone/>
+            </a:pPr>
+            <a:r>
+              <a:rPr lang="de-DE" dirty="0"/>
+              <a:t>Was er nun entdeckte war unglaublich! </a:t>
+            </a:r>
+          </a:p>
+          <a:p>
+            <a:pPr marL="45720" indent="0">
+              <a:buNone/>
+            </a:pPr>
+            <a:r>
+              <a:rPr lang="de-DE" dirty="0"/>
+              <a:t>Ein Bananenbaum! </a:t>
+            </a:r>
+          </a:p>
+          <a:p>
+            <a:pPr marL="45720" indent="0">
+              <a:buNone/>
+            </a:pPr>
+            <a:r>
+              <a:rPr lang="de-DE" dirty="0"/>
+              <a:t>Nur für Yoko! </a:t>
+            </a:r>
+            <a:endParaRPr lang="de-DE" dirty="0" smtClean="0"/>
+          </a:p>
+          <a:p>
+            <a:pPr marL="45720" indent="0">
+              <a:buNone/>
+            </a:pPr>
+            <a:endParaRPr lang="de-DE" dirty="0"/>
+          </a:p>
+          <a:p>
+            <a:pPr marL="45720" indent="0">
+              <a:buNone/>
+            </a:pPr>
+            <a:r>
+              <a:rPr lang="de-DE" dirty="0"/>
+              <a:t>Doch der Affe hat Angst auf den Bananenbaum zu steigen, wie schafft Yoko es eine Banane zu ergattern??</a:t>
+            </a:r>
             <a:endParaRPr lang="de-DE" dirty="0"/>
           </a:p>
         </p:txBody>
@@ -5061,11 +5823,11 @@
   <p:clrMapOvr>
     <a:masterClrMapping/>
   </p:clrMapOvr>
-  <mc:AlternateContent xmlns:mc="http://schemas.openxmlformats.org/markup-compatibility/2006">
-    <mc:Choice xmlns:p14="http://schemas.microsoft.com/office/powerpoint/2010/main" Requires="p14">
+  <mc:AlternateContent xmlns:mc="http://schemas.openxmlformats.org/markup-compatibility/2006" xmlns:p14="http://schemas.microsoft.com/office/powerpoint/2010/main">
+    <mc:Choice Requires="p14">
       <p:transition spd="slow" p14:dur="2000"/>
     </mc:Choice>
-    <mc:Fallback>
+    <mc:Fallback xmlns="">
       <p:transition xmlns:p14="http://schemas.microsoft.com/office/powerpoint/2010/main" spd="slow"/>
     </mc:Fallback>
   </mc:AlternateContent>
@@ -5139,25 +5901,91 @@
         </p:nvSpPr>
         <p:spPr>
           <a:xfrm>
-            <a:off x="1455979" y="2104425"/>
-            <a:ext cx="6400800" cy="3474720"/>
+            <a:off x="5323585" y="2104425"/>
+            <a:ext cx="3377910" cy="3474720"/>
           </a:xfrm>
         </p:spPr>
         <p:txBody>
           <a:bodyPr/>
           <a:lstStyle/>
           <a:p>
+            <a:pPr marL="45720" indent="0">
+              <a:buNone/>
+            </a:pPr>
             <a:r>
               <a:rPr lang="de-DE" dirty="0"/>
-              <a:t>• Auflistung, welche Objekte notwendig sind • Auflistung, welche Animationen </a:t>
+              <a:t>Szene 1</a:t>
+            </a:r>
+          </a:p>
+          <a:p>
+            <a:pPr marL="45720" indent="0">
+              <a:buNone/>
+            </a:pPr>
+            <a:r>
+              <a:rPr lang="de-DE" dirty="0"/>
+              <a:t>Nahaufnahme </a:t>
+            </a:r>
+          </a:p>
+          <a:p>
+            <a:pPr marL="45720" indent="0">
+              <a:buNone/>
+            </a:pPr>
+            <a:r>
+              <a:rPr lang="de-DE" dirty="0"/>
+              <a:t>Das Affengesicht ist zu sehen, die </a:t>
+            </a:r>
+          </a:p>
+          <a:p>
+            <a:pPr marL="45720" indent="0">
+              <a:buNone/>
+            </a:pPr>
+            <a:r>
+              <a:rPr lang="de-DE" dirty="0"/>
+              <a:t>Augen gehen auf und zu. Yoko ist</a:t>
+            </a:r>
+          </a:p>
+          <a:p>
+            <a:pPr marL="45720" indent="0">
+              <a:buNone/>
+            </a:pPr>
+            <a:r>
+              <a:rPr lang="de-DE" dirty="0"/>
+              <a:t>sichtbar verwirrt.</a:t>
             </a:r>
             <a:endParaRPr lang="de-DE" dirty="0"/>
           </a:p>
-          <a:p>
-            <a:endParaRPr lang="de-DE" dirty="0"/>
-          </a:p>
-        </p:txBody>
-      </p:sp>
+        </p:txBody>
+      </p:sp>
+      <p:pic>
+        <p:nvPicPr>
+          <p:cNvPr id="4" name="Bild 3" descr="Bild1.jpg"/>
+          <p:cNvPicPr>
+            <a:picLocks noChangeAspect="1"/>
+          </p:cNvPicPr>
+          <p:nvPr/>
+        </p:nvPicPr>
+        <p:blipFill>
+          <a:blip r:embed="rId2">
+            <a:extLst>
+              <a:ext uri="{28A0092B-C50C-407E-A947-70E740481C1C}">
+                <a14:useLocalDpi xmlns:a14="http://schemas.microsoft.com/office/drawing/2010/main" val="0"/>
+              </a:ext>
+            </a:extLst>
+          </a:blip>
+          <a:stretch>
+            <a:fillRect/>
+          </a:stretch>
+        </p:blipFill>
+        <p:spPr>
+          <a:xfrm>
+            <a:off x="1344268" y="2104425"/>
+            <a:ext cx="3686533" cy="3010866"/>
+          </a:xfrm>
+          <a:prstGeom prst="rect">
+            <a:avLst/>
+          </a:prstGeom>
+        </p:spPr>
+      </p:pic>
     </p:spTree>
     <p:extLst>
       <p:ext uri="{BB962C8B-B14F-4D97-AF65-F5344CB8AC3E}">
@@ -5168,11 +5996,11 @@
   <p:clrMapOvr>
     <a:masterClrMapping/>
   </p:clrMapOvr>
-  <mc:AlternateContent xmlns:mc="http://schemas.openxmlformats.org/markup-compatibility/2006">
-    <mc:Choice xmlns:p14="http://schemas.microsoft.com/office/powerpoint/2010/main" Requires="p14">
+  <mc:AlternateContent xmlns:mc="http://schemas.openxmlformats.org/markup-compatibility/2006" xmlns:p14="http://schemas.microsoft.com/office/powerpoint/2010/main">
+    <mc:Choice Requires="p14">
       <p:transition spd="slow" p14:dur="2000"/>
     </mc:Choice>
-    <mc:Fallback>
+    <mc:Fallback xmlns="">
       <p:transition xmlns:p14="http://schemas.microsoft.com/office/powerpoint/2010/main" spd="slow"/>
     </mc:Fallback>
   </mc:AlternateContent>
@@ -5221,7 +6049,7 @@
             </a:pPr>
             <a:r>
               <a:rPr lang="de-DE" dirty="0" smtClean="0"/>
-              <a:t>Zeitplanung</a:t>
+              <a:t>Storyboard</a:t>
             </a:r>
             <a:endParaRPr lang="de-DE" dirty="0"/>
           </a:p>
@@ -5239,55 +6067,111 @@
         </p:nvSpPr>
         <p:spPr>
           <a:xfrm>
-            <a:off x="1455979" y="2104425"/>
-            <a:ext cx="6400800" cy="3474720"/>
+            <a:off x="5323585" y="2104425"/>
+            <a:ext cx="3377910" cy="3474720"/>
           </a:xfrm>
         </p:spPr>
         <p:txBody>
           <a:bodyPr/>
           <a:lstStyle/>
           <a:p>
+            <a:pPr marL="45720" indent="0">
+              <a:buNone/>
+            </a:pPr>
             <a:r>
               <a:rPr lang="de-DE" dirty="0"/>
-              <a:t>–  Wo liegt das </a:t>
-            </a:r>
-            <a:r>
-              <a:rPr lang="de-DE" dirty="0" err="1"/>
-              <a:t>größte</a:t>
-            </a:r>
+              <a:t>Szene </a:t>
+            </a:r>
+            <a:r>
+              <a:rPr lang="de-DE" dirty="0" smtClean="0"/>
+              <a:t>2</a:t>
+            </a:r>
+            <a:endParaRPr lang="de-DE" dirty="0"/>
+          </a:p>
+          <a:p>
+            <a:pPr marL="45720" indent="0">
+              <a:buNone/>
+            </a:pPr>
             <a:r>
               <a:rPr lang="de-DE" dirty="0"/>
-              <a:t> Risiko? • Wie sieht die </a:t>
-            </a:r>
-            <a:r>
-              <a:rPr lang="de-DE" dirty="0" err="1"/>
-              <a:t>Notlösung</a:t>
-            </a:r>
+              <a:t>Aus der Egoperspektive </a:t>
+            </a:r>
+          </a:p>
+          <a:p>
+            <a:pPr marL="45720" indent="0">
+              <a:buNone/>
+            </a:pPr>
             <a:r>
               <a:rPr lang="de-DE" dirty="0"/>
-              <a:t> aus? </a:t>
-            </a:r>
-            <a:endParaRPr lang="de-DE" dirty="0">
-              <a:effectLst/>
-            </a:endParaRPr>
-          </a:p>
-        </p:txBody>
-      </p:sp>
+              <a:t>Yoko, der Affe, schaut </a:t>
+            </a:r>
+          </a:p>
+          <a:p>
+            <a:pPr marL="45720" indent="0">
+              <a:buNone/>
+            </a:pPr>
+            <a:r>
+              <a:rPr lang="de-DE" dirty="0"/>
+              <a:t>zu seinen Füßen nach links und</a:t>
+            </a:r>
+          </a:p>
+          <a:p>
+            <a:pPr marL="45720" indent="0">
+              <a:buNone/>
+            </a:pPr>
+            <a:r>
+              <a:rPr lang="de-DE" dirty="0"/>
+              <a:t>nach rechts. </a:t>
+            </a:r>
+            <a:endParaRPr lang="de-DE" dirty="0"/>
+          </a:p>
+        </p:txBody>
+      </p:sp>
+      <p:pic>
+        <p:nvPicPr>
+          <p:cNvPr id="5" name="Bild 4" descr="Bild2.jpg"/>
+          <p:cNvPicPr>
+            <a:picLocks noChangeAspect="1"/>
+          </p:cNvPicPr>
+          <p:nvPr/>
+        </p:nvPicPr>
+        <p:blipFill>
+          <a:blip r:embed="rId2">
+            <a:extLst>
+              <a:ext uri="{28A0092B-C50C-407E-A947-70E740481C1C}">
+                <a14:useLocalDpi xmlns:a14="http://schemas.microsoft.com/office/drawing/2010/main" val="0"/>
+              </a:ext>
+            </a:extLst>
+          </a:blip>
+          <a:stretch>
+            <a:fillRect/>
+          </a:stretch>
+        </p:blipFill>
+        <p:spPr>
+          <a:xfrm>
+            <a:off x="1067419" y="1935243"/>
+            <a:ext cx="4141893" cy="3171527"/>
+          </a:xfrm>
+          <a:prstGeom prst="rect">
+            <a:avLst/>
+          </a:prstGeom>
+        </p:spPr>
+      </p:pic>
     </p:spTree>
     <p:extLst>
       <p:ext uri="{BB962C8B-B14F-4D97-AF65-F5344CB8AC3E}">
-        <p14:creationId xmlns:p14="http://schemas.microsoft.com/office/powerpoint/2010/main" val="3277435200"/>
+        <p14:creationId xmlns:p14="http://schemas.microsoft.com/office/powerpoint/2010/main" val="3847202804"/>
       </p:ext>
     </p:extLst>
   </p:cSld>
   <p:clrMapOvr>
     <a:masterClrMapping/>
   </p:clrMapOvr>
-  <mc:AlternateContent xmlns:mc="http://schemas.openxmlformats.org/markup-compatibility/2006">
-    <mc:Choice xmlns:p14="http://schemas.microsoft.com/office/powerpoint/2010/main" Requires="p14">
+  <mc:AlternateContent xmlns:mc="http://schemas.openxmlformats.org/markup-compatibility/2006" xmlns:p14="http://schemas.microsoft.com/office/powerpoint/2010/main">
+    <mc:Choice Requires="p14">
       <p:transition spd="slow" p14:dur="2000"/>
     </mc:Choice>
-    <mc:Fallback>
+    <mc:Fallback xmlns="">
       <p:transition xmlns:p14="http://schemas.microsoft.com/office/powerpoint/2010/main" spd="slow"/>
     </mc:Fallback>
   </mc:AlternateContent>
@@ -5336,7 +6220,7 @@
             </a:pPr>
             <a:r>
               <a:rPr lang="de-DE" dirty="0" smtClean="0"/>
-              <a:t>Quelle</a:t>
+              <a:t>Storyboard</a:t>
             </a:r>
             <a:endParaRPr lang="de-DE" dirty="0"/>
           </a:p>
@@ -5354,45 +6238,128 @@
         </p:nvSpPr>
         <p:spPr>
           <a:xfrm>
-            <a:off x="1455979" y="2104425"/>
-            <a:ext cx="6400800" cy="3474720"/>
-          </a:xfrm>
-        </p:spPr>
-        <p:txBody>
-          <a:bodyPr/>
-          <a:lstStyle/>
-          <a:p>
-            <a:endParaRPr lang="de-DE" dirty="0">
-              <a:effectLst/>
-            </a:endParaRPr>
-          </a:p>
-        </p:txBody>
-      </p:sp>
+            <a:off x="5323585" y="2104425"/>
+            <a:ext cx="3377910" cy="3474720"/>
+          </a:xfrm>
+        </p:spPr>
+        <p:txBody>
+          <a:bodyPr>
+            <a:normAutofit lnSpcReduction="10000"/>
+          </a:bodyPr>
+          <a:lstStyle/>
+          <a:p>
+            <a:pPr marL="45720" indent="0">
+              <a:buNone/>
+            </a:pPr>
+            <a:r>
+              <a:rPr lang="de-DE" dirty="0"/>
+              <a:t>Szene 3</a:t>
+            </a:r>
+          </a:p>
+          <a:p>
+            <a:pPr marL="45720" indent="0">
+              <a:buNone/>
+            </a:pPr>
+            <a:r>
+              <a:rPr lang="de-DE" dirty="0"/>
+              <a:t>Egoperspektive </a:t>
+            </a:r>
+          </a:p>
+          <a:p>
+            <a:pPr marL="45720" indent="0">
+              <a:buNone/>
+            </a:pPr>
+            <a:r>
+              <a:rPr lang="de-DE" dirty="0"/>
+              <a:t>Yoko schaut um sich her, weit und </a:t>
+            </a:r>
+          </a:p>
+          <a:p>
+            <a:pPr marL="45720" indent="0">
+              <a:buNone/>
+            </a:pPr>
+            <a:r>
+              <a:rPr lang="de-DE" dirty="0"/>
+              <a:t>breit nichts zu sehen </a:t>
+            </a:r>
+            <a:r>
+              <a:rPr lang="de-DE" dirty="0" err="1"/>
+              <a:t>ausser</a:t>
+            </a:r>
+            <a:r>
+              <a:rPr lang="de-DE" dirty="0"/>
+              <a:t> </a:t>
+            </a:r>
+          </a:p>
+          <a:p>
+            <a:pPr marL="45720" indent="0">
+              <a:buNone/>
+            </a:pPr>
+            <a:r>
+              <a:rPr lang="de-DE" dirty="0"/>
+              <a:t>dem weiten Meer, den Wellen </a:t>
+            </a:r>
+          </a:p>
+          <a:p>
+            <a:pPr marL="45720" indent="0">
+              <a:buNone/>
+            </a:pPr>
+            <a:r>
+              <a:rPr lang="de-DE" dirty="0"/>
+              <a:t>und einige Vögeln.</a:t>
+            </a:r>
+            <a:endParaRPr lang="de-DE" dirty="0"/>
+          </a:p>
+        </p:txBody>
+      </p:sp>
+      <p:pic>
+        <p:nvPicPr>
+          <p:cNvPr id="5" name="Bild 4" descr="Bild2.jpg"/>
+          <p:cNvPicPr>
+            <a:picLocks noChangeAspect="1"/>
+          </p:cNvPicPr>
+          <p:nvPr/>
+        </p:nvPicPr>
+        <p:blipFill>
+          <a:blip r:embed="rId2">
+            <a:extLst>
+              <a:ext uri="{28A0092B-C50C-407E-A947-70E740481C1C}">
+                <a14:useLocalDpi xmlns:a14="http://schemas.microsoft.com/office/drawing/2010/main" val="0"/>
+              </a:ext>
+            </a:extLst>
+          </a:blip>
+          <a:stretch>
+            <a:fillRect/>
+          </a:stretch>
+        </p:blipFill>
+        <p:spPr>
+          <a:xfrm>
+            <a:off x="1067419" y="1935243"/>
+            <a:ext cx="4141893" cy="3171527"/>
+          </a:xfrm>
+          <a:prstGeom prst="rect">
+            <a:avLst/>
+          </a:prstGeom>
+        </p:spPr>
+      </p:pic>
     </p:spTree>
     <p:extLst>
       <p:ext uri="{BB962C8B-B14F-4D97-AF65-F5344CB8AC3E}">
-        <p14:creationId xmlns:p14="http://schemas.microsoft.com/office/powerpoint/2010/main" val="4275329949"/>
+        <p14:creationId xmlns:p14="http://schemas.microsoft.com/office/powerpoint/2010/main" val="2398718010"/>
       </p:ext>
     </p:extLst>
   </p:cSld>
   <p:clrMapOvr>
     <a:masterClrMapping/>
   </p:clrMapOvr>
-  <mc:AlternateContent xmlns:mc="http://schemas.openxmlformats.org/markup-compatibility/2006">
-    <mc:Choice xmlns:p14="http://schemas.microsoft.com/office/powerpoint/2010/main" Requires="p14">
+  <mc:AlternateContent xmlns:mc="http://schemas.openxmlformats.org/markup-compatibility/2006" xmlns:p14="http://schemas.microsoft.com/office/powerpoint/2010/main">
+    <mc:Choice Requires="p14">
       <p:transition spd="slow" p14:dur="2000"/>
     </mc:Choice>
-    <mc:Fallback>
+    <mc:Fallback xmlns="">
       <p:transition xmlns:p14="http://schemas.microsoft.com/office/powerpoint/2010/main" spd="slow"/>
     </mc:Fallback>
   </mc:AlternateContent>
-  <p:timing>
-    <p:tnLst>
-      <p:par>
-        <p:cTn xmlns:p14="http://schemas.microsoft.com/office/powerpoint/2010/main" id="1" dur="indefinite" restart="never" nodeType="tmRoot"/>
-      </p:par>
-    </p:tnLst>
-  </p:timing>
 </p:sld>
 </file>
 
@@ -5413,15 +6380,142 @@
           <a:chExt cx="0" cy="0"/>
         </a:xfrm>
       </p:grpSpPr>
+      <p:sp>
+        <p:nvSpPr>
+          <p:cNvPr id="2" name="Titel 1"/>
+          <p:cNvSpPr>
+            <a:spLocks noGrp="1"/>
+          </p:cNvSpPr>
+          <p:nvPr>
+            <p:ph type="title"/>
+          </p:nvPr>
+        </p:nvSpPr>
+        <p:spPr>
+          <a:xfrm>
+            <a:off x="1344268" y="280137"/>
+            <a:ext cx="6512511" cy="1143000"/>
+          </a:xfrm>
+        </p:spPr>
+        <p:txBody>
+          <a:bodyPr/>
+          <a:lstStyle/>
+          <a:p>
+            <a:pPr marL="0" indent="0" algn="ctr">
+              <a:buNone/>
+            </a:pPr>
+            <a:r>
+              <a:rPr lang="de-DE" dirty="0" smtClean="0"/>
+              <a:t>Storyboard</a:t>
+            </a:r>
+            <a:endParaRPr lang="de-DE" dirty="0"/>
+          </a:p>
+        </p:txBody>
+      </p:sp>
+      <p:sp>
+        <p:nvSpPr>
+          <p:cNvPr id="3" name="Inhaltsplatzhalter 2"/>
+          <p:cNvSpPr>
+            <a:spLocks noGrp="1"/>
+          </p:cNvSpPr>
+          <p:nvPr>
+            <p:ph sz="quarter" idx="13"/>
+          </p:nvPr>
+        </p:nvSpPr>
+        <p:spPr>
+          <a:xfrm>
+            <a:off x="5323585" y="2104425"/>
+            <a:ext cx="3377910" cy="3474720"/>
+          </a:xfrm>
+        </p:spPr>
+        <p:txBody>
+          <a:bodyPr>
+            <a:normAutofit fontScale="85000" lnSpcReduction="20000"/>
+          </a:bodyPr>
+          <a:lstStyle/>
+          <a:p>
+            <a:pPr marL="45720" indent="0">
+              <a:buNone/>
+            </a:pPr>
+            <a:r>
+              <a:rPr lang="de-DE" dirty="0"/>
+              <a:t>Szene </a:t>
+            </a:r>
+            <a:r>
+              <a:rPr lang="de-DE" dirty="0" smtClean="0"/>
+              <a:t>4</a:t>
+            </a:r>
+          </a:p>
+          <a:p>
+            <a:pPr marL="45720" indent="0">
+              <a:buNone/>
+            </a:pPr>
+            <a:r>
+              <a:rPr lang="de-DE" dirty="0"/>
+              <a:t>Egoperspektive </a:t>
+            </a:r>
+          </a:p>
+          <a:p>
+            <a:pPr marL="45720" indent="0">
+              <a:buNone/>
+            </a:pPr>
+            <a:r>
+              <a:rPr lang="de-DE" dirty="0"/>
+              <a:t>Vor lauter </a:t>
+            </a:r>
+            <a:r>
+              <a:rPr lang="de-DE" dirty="0" err="1"/>
+              <a:t>Verzweifelung</a:t>
+            </a:r>
+            <a:r>
+              <a:rPr lang="de-DE" dirty="0"/>
+              <a:t> und </a:t>
+            </a:r>
+          </a:p>
+          <a:p>
+            <a:pPr marL="45720" indent="0">
+              <a:buNone/>
+            </a:pPr>
+            <a:r>
+              <a:rPr lang="de-DE" dirty="0"/>
+              <a:t>Hilfslosigkeit schaut der kleine Affe </a:t>
+            </a:r>
+          </a:p>
+          <a:p>
+            <a:pPr marL="45720" indent="0">
+              <a:buNone/>
+            </a:pPr>
+            <a:r>
+              <a:rPr lang="de-DE" dirty="0"/>
+              <a:t>nach oben, Richtung Himmel. </a:t>
+            </a:r>
+          </a:p>
+          <a:p>
+            <a:pPr marL="45720" indent="0">
+              <a:buNone/>
+            </a:pPr>
+            <a:r>
+              <a:rPr lang="de-DE" dirty="0"/>
+              <a:t>Siehe da! Er kann seinen Augen kaum </a:t>
+            </a:r>
+          </a:p>
+          <a:p>
+            <a:pPr marL="45720" indent="0">
+              <a:buNone/>
+            </a:pPr>
+            <a:r>
+              <a:rPr lang="de-DE" dirty="0"/>
+              <a:t>glauben! Ein Bananenbaum!!!!</a:t>
+            </a:r>
+          </a:p>
+        </p:txBody>
+      </p:sp>
       <p:pic>
         <p:nvPicPr>
-          <p:cNvPr id="4" name="Inhaltsplatzhalter 3" descr="NeuLandschaft_0002.jpg"/>
+          <p:cNvPr id="4" name="Bild 3" descr="Bild4.jpg"/>
           <p:cNvPicPr>
-            <a:picLocks noGrp="1" noChangeAspect="1"/>
+            <a:picLocks noChangeAspect="1"/>
           </p:cNvPicPr>
-          <p:nvPr>
-            <p:ph sz="quarter" idx="13"/>
-          </p:nvPr>
+          <p:nvPr/>
         </p:nvPicPr>
         <p:blipFill>
           <a:blip r:embed="rId2">
@@ -5431,51 +6525,551 @@
               </a:ext>
             </a:extLst>
           </a:blip>
-          <a:srcRect t="13806" b="13806"/>
           <a:stretch>
             <a:fillRect/>
           </a:stretch>
         </p:blipFill>
         <p:spPr>
           <a:xfrm>
-            <a:off x="365145" y="216342"/>
-            <a:ext cx="8389760" cy="4554441"/>
-          </a:xfrm>
-          <a:prstGeom prst="roundRect">
-            <a:avLst>
-              <a:gd name="adj" fmla="val 8594"/>
-            </a:avLst>
+            <a:off x="1344267" y="2104425"/>
+            <a:ext cx="3979317" cy="3167997"/>
+          </a:xfrm>
+          <a:prstGeom prst="rect">
+            <a:avLst/>
           </a:prstGeom>
-          <a:solidFill>
-            <a:srgbClr val="FFFFFF">
-              <a:shade val="85000"/>
-            </a:srgbClr>
-          </a:solidFill>
-          <a:ln>
-            <a:noFill/>
-          </a:ln>
-          <a:effectLst>
-            <a:reflection blurRad="12700" stA="38000" endPos="28000" dist="5000" dir="5400000" sy="-100000" algn="bl" rotWithShape="0"/>
-          </a:effectLst>
         </p:spPr>
       </p:pic>
     </p:spTree>
     <p:extLst>
       <p:ext uri="{BB962C8B-B14F-4D97-AF65-F5344CB8AC3E}">
-        <p14:creationId xmlns:p14="http://schemas.microsoft.com/office/powerpoint/2010/main" val="2141247327"/>
+        <p14:creationId xmlns:p14="http://schemas.microsoft.com/office/powerpoint/2010/main" val="1680638933"/>
       </p:ext>
     </p:extLst>
   </p:cSld>
   <p:clrMapOvr>
     <a:masterClrMapping/>
   </p:clrMapOvr>
-  <p:timing>
-    <p:tnLst>
-      <p:par>
-        <p:cTn xmlns:p14="http://schemas.microsoft.com/office/powerpoint/2010/main" id="1" dur="indefinite" restart="never" nodeType="tmRoot"/>
-      </p:par>
-    </p:tnLst>
-  </p:timing>
+  <mc:AlternateContent xmlns:mc="http://schemas.openxmlformats.org/markup-compatibility/2006" xmlns:p14="http://schemas.microsoft.com/office/powerpoint/2010/main">
+    <mc:Choice Requires="p14">
+      <p:transition spd="slow" p14:dur="2000"/>
+    </mc:Choice>
+    <mc:Fallback xmlns="">
+      <p:transition xmlns:p14="http://schemas.microsoft.com/office/powerpoint/2010/main" spd="slow"/>
+    </mc:Fallback>
+  </mc:AlternateContent>
+</p:sld>
+</file>
+
+<file path=ppt/slides/slide7.xml><?xml version="1.0" encoding="utf-8"?>
+<p:sld xmlns:a="http://schemas.openxmlformats.org/drawingml/2006/main" xmlns:r="http://schemas.openxmlformats.org/officeDocument/2006/relationships" xmlns:p="http://schemas.openxmlformats.org/presentationml/2006/main">
+  <p:cSld>
+    <p:spTree>
+      <p:nvGrpSpPr>
+        <p:cNvPr id="1" name=""/>
+        <p:cNvGrpSpPr/>
+        <p:nvPr/>
+      </p:nvGrpSpPr>
+      <p:grpSpPr>
+        <a:xfrm>
+          <a:off x="0" y="0"/>
+          <a:ext cx="0" cy="0"/>
+          <a:chOff x="0" y="0"/>
+          <a:chExt cx="0" cy="0"/>
+        </a:xfrm>
+      </p:grpSpPr>
+      <p:sp>
+        <p:nvSpPr>
+          <p:cNvPr id="2" name="Titel 1"/>
+          <p:cNvSpPr>
+            <a:spLocks noGrp="1"/>
+          </p:cNvSpPr>
+          <p:nvPr>
+            <p:ph type="title"/>
+          </p:nvPr>
+        </p:nvSpPr>
+        <p:spPr>
+          <a:xfrm>
+            <a:off x="1344268" y="280137"/>
+            <a:ext cx="6512511" cy="1143000"/>
+          </a:xfrm>
+        </p:spPr>
+        <p:txBody>
+          <a:bodyPr/>
+          <a:lstStyle/>
+          <a:p>
+            <a:pPr marL="0" indent="0" algn="ctr">
+              <a:buNone/>
+            </a:pPr>
+            <a:r>
+              <a:rPr lang="de-DE" dirty="0" smtClean="0"/>
+              <a:t>Storyboard</a:t>
+            </a:r>
+            <a:endParaRPr lang="de-DE" dirty="0"/>
+          </a:p>
+        </p:txBody>
+      </p:sp>
+      <p:sp>
+        <p:nvSpPr>
+          <p:cNvPr id="3" name="Inhaltsplatzhalter 2"/>
+          <p:cNvSpPr>
+            <a:spLocks noGrp="1"/>
+          </p:cNvSpPr>
+          <p:nvPr>
+            <p:ph sz="quarter" idx="13"/>
+          </p:nvPr>
+        </p:nvSpPr>
+        <p:spPr>
+          <a:xfrm>
+            <a:off x="5323585" y="2104425"/>
+            <a:ext cx="3377910" cy="3474720"/>
+          </a:xfrm>
+        </p:spPr>
+        <p:txBody>
+          <a:bodyPr>
+            <a:normAutofit fontScale="85000" lnSpcReduction="20000"/>
+          </a:bodyPr>
+          <a:lstStyle/>
+          <a:p>
+            <a:pPr marL="45720" indent="0">
+              <a:buNone/>
+            </a:pPr>
+            <a:r>
+              <a:rPr lang="de-DE" dirty="0"/>
+              <a:t>Szene 5</a:t>
+            </a:r>
+            <a:endParaRPr lang="de-DE" dirty="0" smtClean="0"/>
+          </a:p>
+          <a:p>
+            <a:pPr marL="45720" indent="0">
+              <a:buNone/>
+            </a:pPr>
+            <a:r>
+              <a:rPr lang="de-DE" dirty="0"/>
+              <a:t>Doch Yoko ist sehr unsicher. Er hat</a:t>
+            </a:r>
+          </a:p>
+          <a:p>
+            <a:pPr marL="45720" indent="0">
+              <a:buNone/>
+            </a:pPr>
+            <a:r>
+              <a:rPr lang="de-DE" dirty="0"/>
+              <a:t>Angst und traut sich nicht auf den </a:t>
+            </a:r>
+          </a:p>
+          <a:p>
+            <a:pPr marL="45720" indent="0">
+              <a:buNone/>
+            </a:pPr>
+            <a:r>
+              <a:rPr lang="de-DE" dirty="0"/>
+              <a:t>Bananenbaum. Doch da kommt ihm </a:t>
+            </a:r>
+          </a:p>
+          <a:p>
+            <a:pPr marL="45720" indent="0">
+              <a:buNone/>
+            </a:pPr>
+            <a:r>
+              <a:rPr lang="de-DE" dirty="0"/>
+              <a:t>eine neue Idee! Der kleine Affe rüttelt</a:t>
+            </a:r>
+          </a:p>
+          <a:p>
+            <a:pPr marL="45720" indent="0">
+              <a:buNone/>
+            </a:pPr>
+            <a:r>
+              <a:rPr lang="de-DE" dirty="0"/>
+              <a:t>voller Elan am Baum, in der Hoffnung </a:t>
+            </a:r>
+          </a:p>
+          <a:p>
+            <a:pPr marL="45720" indent="0">
+              <a:buNone/>
+            </a:pPr>
+            <a:r>
+              <a:rPr lang="de-DE" dirty="0"/>
+              <a:t>eine Banane zu ergattern.</a:t>
+            </a:r>
+          </a:p>
+        </p:txBody>
+      </p:sp>
+      <p:pic>
+        <p:nvPicPr>
+          <p:cNvPr id="5" name="Bild 4" descr="Bild5.jpg"/>
+          <p:cNvPicPr>
+            <a:picLocks noChangeAspect="1"/>
+          </p:cNvPicPr>
+          <p:nvPr/>
+        </p:nvPicPr>
+        <p:blipFill>
+          <a:blip r:embed="rId2">
+            <a:extLst>
+              <a:ext uri="{28A0092B-C50C-407E-A947-70E740481C1C}">
+                <a14:useLocalDpi xmlns:a14="http://schemas.microsoft.com/office/drawing/2010/main" val="0"/>
+              </a:ext>
+            </a:extLst>
+          </a:blip>
+          <a:stretch>
+            <a:fillRect/>
+          </a:stretch>
+        </p:blipFill>
+        <p:spPr>
+          <a:xfrm>
+            <a:off x="1344268" y="2104425"/>
+            <a:ext cx="3919814" cy="3347667"/>
+          </a:xfrm>
+          <a:prstGeom prst="rect">
+            <a:avLst/>
+          </a:prstGeom>
+        </p:spPr>
+      </p:pic>
+    </p:spTree>
+    <p:extLst>
+      <p:ext uri="{BB962C8B-B14F-4D97-AF65-F5344CB8AC3E}">
+        <p14:creationId xmlns:p14="http://schemas.microsoft.com/office/powerpoint/2010/main" val="1899046127"/>
+      </p:ext>
+    </p:extLst>
+  </p:cSld>
+  <p:clrMapOvr>
+    <a:masterClrMapping/>
+  </p:clrMapOvr>
+  <mc:AlternateContent xmlns:mc="http://schemas.openxmlformats.org/markup-compatibility/2006" xmlns:p14="http://schemas.microsoft.com/office/powerpoint/2010/main">
+    <mc:Choice Requires="p14">
+      <p:transition spd="slow" p14:dur="2000"/>
+    </mc:Choice>
+    <mc:Fallback xmlns="">
+      <p:transition xmlns:p14="http://schemas.microsoft.com/office/powerpoint/2010/main" spd="slow"/>
+    </mc:Fallback>
+  </mc:AlternateContent>
+</p:sld>
+</file>
+
+<file path=ppt/slides/slide8.xml><?xml version="1.0" encoding="utf-8"?>
+<p:sld xmlns:a="http://schemas.openxmlformats.org/drawingml/2006/main" xmlns:r="http://schemas.openxmlformats.org/officeDocument/2006/relationships" xmlns:p="http://schemas.openxmlformats.org/presentationml/2006/main">
+  <p:cSld>
+    <p:spTree>
+      <p:nvGrpSpPr>
+        <p:cNvPr id="1" name=""/>
+        <p:cNvGrpSpPr/>
+        <p:nvPr/>
+      </p:nvGrpSpPr>
+      <p:grpSpPr>
+        <a:xfrm>
+          <a:off x="0" y="0"/>
+          <a:ext cx="0" cy="0"/>
+          <a:chOff x="0" y="0"/>
+          <a:chExt cx="0" cy="0"/>
+        </a:xfrm>
+      </p:grpSpPr>
+      <p:sp>
+        <p:nvSpPr>
+          <p:cNvPr id="2" name="Titel 1"/>
+          <p:cNvSpPr>
+            <a:spLocks noGrp="1"/>
+          </p:cNvSpPr>
+          <p:nvPr>
+            <p:ph type="title"/>
+          </p:nvPr>
+        </p:nvSpPr>
+        <p:spPr>
+          <a:xfrm>
+            <a:off x="1344268" y="280137"/>
+            <a:ext cx="6512511" cy="1143000"/>
+          </a:xfrm>
+        </p:spPr>
+        <p:txBody>
+          <a:bodyPr/>
+          <a:lstStyle/>
+          <a:p>
+            <a:pPr marL="0" indent="0" algn="ctr">
+              <a:buNone/>
+            </a:pPr>
+            <a:r>
+              <a:rPr lang="de-DE" dirty="0" smtClean="0"/>
+              <a:t>Storyboard</a:t>
+            </a:r>
+            <a:endParaRPr lang="de-DE" dirty="0"/>
+          </a:p>
+        </p:txBody>
+      </p:sp>
+      <p:sp>
+        <p:nvSpPr>
+          <p:cNvPr id="3" name="Inhaltsplatzhalter 2"/>
+          <p:cNvSpPr>
+            <a:spLocks noGrp="1"/>
+          </p:cNvSpPr>
+          <p:nvPr>
+            <p:ph sz="quarter" idx="13"/>
+          </p:nvPr>
+        </p:nvSpPr>
+        <p:spPr>
+          <a:xfrm>
+            <a:off x="5323585" y="2104425"/>
+            <a:ext cx="3377910" cy="3474720"/>
+          </a:xfrm>
+        </p:spPr>
+        <p:txBody>
+          <a:bodyPr>
+            <a:normAutofit/>
+          </a:bodyPr>
+          <a:lstStyle/>
+          <a:p>
+            <a:pPr marL="45720" indent="0">
+              <a:buNone/>
+            </a:pPr>
+            <a:r>
+              <a:rPr lang="de-DE" dirty="0"/>
+              <a:t>Szene </a:t>
+            </a:r>
+            <a:r>
+              <a:rPr lang="de-DE" dirty="0" smtClean="0"/>
+              <a:t>6</a:t>
+            </a:r>
+          </a:p>
+          <a:p>
+            <a:pPr marL="45720" indent="0">
+              <a:buNone/>
+            </a:pPr>
+            <a:r>
+              <a:rPr lang="de-DE" dirty="0"/>
+              <a:t>Yoko streckt seine </a:t>
+            </a:r>
+          </a:p>
+          <a:p>
+            <a:pPr marL="45720" indent="0">
+              <a:buNone/>
+            </a:pPr>
+            <a:r>
+              <a:rPr lang="de-DE" dirty="0"/>
+              <a:t>Hand aus.... und </a:t>
+            </a:r>
+          </a:p>
+          <a:p>
+            <a:pPr marL="45720" indent="0">
+              <a:buNone/>
+            </a:pPr>
+            <a:r>
+              <a:rPr lang="de-DE" dirty="0"/>
+              <a:t>rüttelt weiter....</a:t>
+            </a:r>
+          </a:p>
+        </p:txBody>
+      </p:sp>
+      <p:pic>
+        <p:nvPicPr>
+          <p:cNvPr id="4" name="Bild 3" descr="Bild6.jpg"/>
+          <p:cNvPicPr>
+            <a:picLocks noChangeAspect="1"/>
+          </p:cNvPicPr>
+          <p:nvPr/>
+        </p:nvPicPr>
+        <p:blipFill>
+          <a:blip r:embed="rId2">
+            <a:extLst>
+              <a:ext uri="{28A0092B-C50C-407E-A947-70E740481C1C}">
+                <a14:useLocalDpi xmlns:a14="http://schemas.microsoft.com/office/drawing/2010/main" val="0"/>
+              </a:ext>
+            </a:extLst>
+          </a:blip>
+          <a:stretch>
+            <a:fillRect/>
+          </a:stretch>
+        </p:blipFill>
+        <p:spPr>
+          <a:xfrm>
+            <a:off x="1573966" y="2253035"/>
+            <a:ext cx="3749619" cy="2889615"/>
+          </a:xfrm>
+          <a:prstGeom prst="rect">
+            <a:avLst/>
+          </a:prstGeom>
+        </p:spPr>
+      </p:pic>
+    </p:spTree>
+    <p:extLst>
+      <p:ext uri="{BB962C8B-B14F-4D97-AF65-F5344CB8AC3E}">
+        <p14:creationId xmlns:p14="http://schemas.microsoft.com/office/powerpoint/2010/main" val="5965437"/>
+      </p:ext>
+    </p:extLst>
+  </p:cSld>
+  <p:clrMapOvr>
+    <a:masterClrMapping/>
+  </p:clrMapOvr>
+  <mc:AlternateContent xmlns:mc="http://schemas.openxmlformats.org/markup-compatibility/2006" xmlns:p14="http://schemas.microsoft.com/office/powerpoint/2010/main">
+    <mc:Choice Requires="p14">
+      <p:transition spd="slow" p14:dur="2000"/>
+    </mc:Choice>
+    <mc:Fallback xmlns="">
+      <p:transition xmlns:p14="http://schemas.microsoft.com/office/powerpoint/2010/main" spd="slow"/>
+    </mc:Fallback>
+  </mc:AlternateContent>
+</p:sld>
+</file>
+
+<file path=ppt/slides/slide9.xml><?xml version="1.0" encoding="utf-8"?>
+<p:sld xmlns:a="http://schemas.openxmlformats.org/drawingml/2006/main" xmlns:r="http://schemas.openxmlformats.org/officeDocument/2006/relationships" xmlns:p="http://schemas.openxmlformats.org/presentationml/2006/main">
+  <p:cSld>
+    <p:spTree>
+      <p:nvGrpSpPr>
+        <p:cNvPr id="1" name=""/>
+        <p:cNvGrpSpPr/>
+        <p:nvPr/>
+      </p:nvGrpSpPr>
+      <p:grpSpPr>
+        <a:xfrm>
+          <a:off x="0" y="0"/>
+          <a:ext cx="0" cy="0"/>
+          <a:chOff x="0" y="0"/>
+          <a:chExt cx="0" cy="0"/>
+        </a:xfrm>
+      </p:grpSpPr>
+      <p:sp>
+        <p:nvSpPr>
+          <p:cNvPr id="2" name="Titel 1"/>
+          <p:cNvSpPr>
+            <a:spLocks noGrp="1"/>
+          </p:cNvSpPr>
+          <p:nvPr>
+            <p:ph type="title"/>
+          </p:nvPr>
+        </p:nvSpPr>
+        <p:spPr>
+          <a:xfrm>
+            <a:off x="1344268" y="280137"/>
+            <a:ext cx="6512511" cy="1143000"/>
+          </a:xfrm>
+        </p:spPr>
+        <p:txBody>
+          <a:bodyPr/>
+          <a:lstStyle/>
+          <a:p>
+            <a:pPr marL="0" indent="0" algn="ctr">
+              <a:buNone/>
+            </a:pPr>
+            <a:r>
+              <a:rPr lang="de-DE" dirty="0" smtClean="0"/>
+              <a:t>Storyboard</a:t>
+            </a:r>
+            <a:endParaRPr lang="de-DE" dirty="0"/>
+          </a:p>
+        </p:txBody>
+      </p:sp>
+      <p:sp>
+        <p:nvSpPr>
+          <p:cNvPr id="3" name="Inhaltsplatzhalter 2"/>
+          <p:cNvSpPr>
+            <a:spLocks noGrp="1"/>
+          </p:cNvSpPr>
+          <p:nvPr>
+            <p:ph sz="quarter" idx="13"/>
+          </p:nvPr>
+        </p:nvSpPr>
+        <p:spPr>
+          <a:xfrm>
+            <a:off x="5323585" y="2104425"/>
+            <a:ext cx="3377910" cy="3474720"/>
+          </a:xfrm>
+        </p:spPr>
+        <p:txBody>
+          <a:bodyPr>
+            <a:normAutofit/>
+          </a:bodyPr>
+          <a:lstStyle/>
+          <a:p>
+            <a:pPr marL="45720" indent="0">
+              <a:buNone/>
+            </a:pPr>
+            <a:r>
+              <a:rPr lang="de-DE" dirty="0"/>
+              <a:t>Szene 7</a:t>
+            </a:r>
+            <a:endParaRPr lang="de-DE" dirty="0" smtClean="0"/>
+          </a:p>
+          <a:p>
+            <a:pPr marL="45720" indent="0">
+              <a:buNone/>
+            </a:pPr>
+            <a:r>
+              <a:rPr lang="de-DE" dirty="0"/>
+              <a:t>Da geschah es! </a:t>
+            </a:r>
+          </a:p>
+          <a:p>
+            <a:pPr marL="45720" indent="0">
+              <a:buNone/>
+            </a:pPr>
+            <a:r>
+              <a:rPr lang="de-DE" dirty="0"/>
+              <a:t>Eine Banane fiel vom Baum herunter...</a:t>
+            </a:r>
+          </a:p>
+          <a:p>
+            <a:pPr marL="45720" indent="0">
+              <a:buNone/>
+            </a:pPr>
+            <a:r>
+              <a:rPr lang="de-DE" dirty="0"/>
+              <a:t>direkt in die Hand von Yoko!</a:t>
+            </a:r>
+          </a:p>
+          <a:p>
+            <a:pPr marL="45720" indent="0">
+              <a:buNone/>
+            </a:pPr>
+            <a:endParaRPr lang="de-DE" dirty="0"/>
+          </a:p>
+        </p:txBody>
+      </p:sp>
+      <p:pic>
+        <p:nvPicPr>
+          <p:cNvPr id="5" name="Bild 4" descr="Bild7.jpg"/>
+          <p:cNvPicPr>
+            <a:picLocks noChangeAspect="1"/>
+          </p:cNvPicPr>
+          <p:nvPr/>
+        </p:nvPicPr>
+        <p:blipFill>
+          <a:blip r:embed="rId2">
+            <a:extLst>
+              <a:ext uri="{28A0092B-C50C-407E-A947-70E740481C1C}">
+                <a14:useLocalDpi xmlns:a14="http://schemas.microsoft.com/office/drawing/2010/main" val="0"/>
+              </a:ext>
+            </a:extLst>
+          </a:blip>
+          <a:stretch>
+            <a:fillRect/>
+          </a:stretch>
+        </p:blipFill>
+        <p:spPr>
+          <a:xfrm>
+            <a:off x="1257352" y="2104425"/>
+            <a:ext cx="4066233" cy="2826715"/>
+          </a:xfrm>
+          <a:prstGeom prst="rect">
+            <a:avLst/>
+          </a:prstGeom>
+        </p:spPr>
+      </p:pic>
+    </p:spTree>
+    <p:extLst>
+      <p:ext uri="{BB962C8B-B14F-4D97-AF65-F5344CB8AC3E}">
+        <p14:creationId xmlns:p14="http://schemas.microsoft.com/office/powerpoint/2010/main" val="1145863845"/>
+      </p:ext>
+    </p:extLst>
+  </p:cSld>
+  <p:clrMapOvr>
+    <a:masterClrMapping/>
+  </p:clrMapOvr>
+  <mc:AlternateContent xmlns:mc="http://schemas.openxmlformats.org/markup-compatibility/2006" xmlns:p14="http://schemas.microsoft.com/office/powerpoint/2010/main">
+    <mc:Choice Requires="p14">
+      <p:transition spd="slow" p14:dur="2000"/>
+    </mc:Choice>
+    <mc:Fallback xmlns="">
+      <p:transition xmlns:p14="http://schemas.microsoft.com/office/powerpoint/2010/main" spd="slow"/>
+    </mc:Fallback>
+  </mc:AlternateContent>
 </p:sld>
 </file>
 

</xml_diff>

<commit_message>
Aenderung von letzter Woche
</commit_message>
<xml_diff>
--- a/Präsentationen/01 Planungsphase/Planungspraesentation_MeltemOezkul_MOE_51.pptx
+++ b/Präsentationen/01 Planungsphase/Planungspraesentation_MeltemOezkul_MOE_51.pptx
@@ -5,7 +5,7 @@
     <p:sldMasterId id="2147484051" r:id="rId1"/>
   </p:sldMasterIdLst>
   <p:notesMasterIdLst>
-    <p:notesMasterId r:id="rId16"/>
+    <p:notesMasterId r:id="rId19"/>
   </p:notesMasterIdLst>
   <p:sldIdLst>
     <p:sldId id="256" r:id="rId2"/>
@@ -20,8 +20,11 @@
     <p:sldId id="268" r:id="rId11"/>
     <p:sldId id="269" r:id="rId12"/>
     <p:sldId id="270" r:id="rId13"/>
-    <p:sldId id="260" r:id="rId14"/>
-    <p:sldId id="261" r:id="rId15"/>
+    <p:sldId id="271" r:id="rId14"/>
+    <p:sldId id="273" r:id="rId15"/>
+    <p:sldId id="272" r:id="rId16"/>
+    <p:sldId id="260" r:id="rId17"/>
+    <p:sldId id="261" r:id="rId18"/>
   </p:sldIdLst>
   <p:sldSz cx="9144000" cy="6858000" type="screen4x3"/>
   <p:notesSz cx="6858000" cy="9144000"/>
@@ -205,7 +208,7 @@
           <a:p>
             <a:fld id="{7074DE81-99FF-944E-9C69-3A5EFC18925A}" type="datetimeFigureOut">
               <a:rPr lang="de-DE" smtClean="0"/>
-              <a:t>26.11.14</a:t>
+              <a:t>27.11.14</a:t>
             </a:fld>
             <a:endParaRPr lang="de-DE"/>
           </a:p>
@@ -895,7 +898,7 @@
           <a:p>
             <a:fld id="{2069C06D-4ED8-42C6-905D-CA84CA1B6CBF}" type="datetime2">
               <a:rPr lang="en-US" smtClean="0"/>
-              <a:t>Mittwoch, 26. November 14</a:t>
+              <a:t>Donnerstag, 27. November 14</a:t>
             </a:fld>
             <a:endParaRPr lang="en-US" dirty="0"/>
           </a:p>
@@ -1107,7 +1110,7 @@
           <a:p>
             <a:fld id="{BF6703E8-CF71-8F4B-8B4E-92ADC2BF80FD}" type="datetimeFigureOut">
               <a:rPr lang="de-DE" smtClean="0"/>
-              <a:t>26.11.14</a:t>
+              <a:t>27.11.14</a:t>
             </a:fld>
             <a:endParaRPr lang="de-DE"/>
           </a:p>
@@ -1294,7 +1297,7 @@
           <a:p>
             <a:fld id="{BF6703E8-CF71-8F4B-8B4E-92ADC2BF80FD}" type="datetimeFigureOut">
               <a:rPr lang="de-DE" smtClean="0"/>
-              <a:t>26.11.14</a:t>
+              <a:t>27.11.14</a:t>
             </a:fld>
             <a:endParaRPr lang="de-DE"/>
           </a:p>
@@ -1391,7 +1394,7 @@
           <a:p>
             <a:fld id="{BF6703E8-CF71-8F4B-8B4E-92ADC2BF80FD}" type="datetimeFigureOut">
               <a:rPr lang="de-DE" smtClean="0"/>
-              <a:t>26.11.14</a:t>
+              <a:t>27.11.14</a:t>
             </a:fld>
             <a:endParaRPr lang="de-DE"/>
           </a:p>
@@ -1987,7 +1990,7 @@
           <a:p>
             <a:fld id="{3AD8CDC4-3D19-4983-B478-82F6B8E5AB66}" type="datetime2">
               <a:rPr lang="en-US" smtClean="0"/>
-              <a:t>Mittwoch, 26. November 14</a:t>
+              <a:t>Donnerstag, 27. November 14</a:t>
             </a:fld>
             <a:endParaRPr lang="en-US" dirty="0"/>
           </a:p>
@@ -2084,7 +2087,7 @@
           <a:p>
             <a:fld id="{BF6703E8-CF71-8F4B-8B4E-92ADC2BF80FD}" type="datetimeFigureOut">
               <a:rPr lang="de-DE" smtClean="0"/>
-              <a:t>26.11.14</a:t>
+              <a:t>27.11.14</a:t>
             </a:fld>
             <a:endParaRPr lang="de-DE"/>
           </a:p>
@@ -2689,7 +2692,7 @@
           <a:p>
             <a:fld id="{BF6703E8-CF71-8F4B-8B4E-92ADC2BF80FD}" type="datetimeFigureOut">
               <a:rPr lang="de-DE" smtClean="0"/>
-              <a:t>26.11.14</a:t>
+              <a:t>27.11.14</a:t>
             </a:fld>
             <a:endParaRPr lang="de-DE"/>
           </a:p>
@@ -2832,7 +2835,7 @@
           <a:p>
             <a:fld id="{BF6703E8-CF71-8F4B-8B4E-92ADC2BF80FD}" type="datetimeFigureOut">
               <a:rPr lang="de-DE" smtClean="0"/>
-              <a:t>26.11.14</a:t>
+              <a:t>27.11.14</a:t>
             </a:fld>
             <a:endParaRPr lang="de-DE"/>
           </a:p>
@@ -2929,7 +2932,7 @@
           <a:p>
             <a:fld id="{BF6703E8-CF71-8F4B-8B4E-92ADC2BF80FD}" type="datetimeFigureOut">
               <a:rPr lang="de-DE" smtClean="0"/>
-              <a:t>26.11.14</a:t>
+              <a:t>27.11.14</a:t>
             </a:fld>
             <a:endParaRPr lang="de-DE"/>
           </a:p>
@@ -3213,7 +3216,7 @@
           <a:p>
             <a:fld id="{BF6703E8-CF71-8F4B-8B4E-92ADC2BF80FD}" type="datetimeFigureOut">
               <a:rPr lang="de-DE" smtClean="0"/>
-              <a:t>26.11.14</a:t>
+              <a:t>27.11.14</a:t>
             </a:fld>
             <a:endParaRPr lang="de-DE"/>
           </a:p>
@@ -3735,7 +3738,7 @@
           <a:p>
             <a:fld id="{BF6703E8-CF71-8F4B-8B4E-92ADC2BF80FD}" type="datetimeFigureOut">
               <a:rPr lang="de-DE" smtClean="0"/>
-              <a:t>26.11.14</a:t>
+              <a:t>27.11.14</a:t>
             </a:fld>
             <a:endParaRPr lang="de-DE"/>
           </a:p>
@@ -4255,7 +4258,7 @@
           <a:p>
             <a:fld id="{BF6703E8-CF71-8F4B-8B4E-92ADC2BF80FD}" type="datetimeFigureOut">
               <a:rPr lang="de-DE" smtClean="0"/>
-              <a:t>26.11.14</a:t>
+              <a:t>27.11.14</a:t>
             </a:fld>
             <a:endParaRPr lang="de-DE"/>
           </a:p>
@@ -5504,6 +5507,435 @@
         </p:nvSpPr>
         <p:spPr>
           <a:xfrm>
+            <a:off x="1615907" y="535336"/>
+            <a:ext cx="6512511" cy="1143000"/>
+          </a:xfrm>
+        </p:spPr>
+        <p:txBody>
+          <a:bodyPr/>
+          <a:lstStyle/>
+          <a:p>
+            <a:pPr marL="0" indent="0" algn="ctr">
+              <a:buNone/>
+            </a:pPr>
+            <a:r>
+              <a:rPr lang="de-DE" dirty="0" smtClean="0"/>
+              <a:t>Welche Objekte sind notwendig?</a:t>
+            </a:r>
+            <a:endParaRPr lang="de-DE" dirty="0"/>
+          </a:p>
+        </p:txBody>
+      </p:sp>
+      <p:sp>
+        <p:nvSpPr>
+          <p:cNvPr id="3" name="Inhaltsplatzhalter 2"/>
+          <p:cNvSpPr>
+            <a:spLocks noGrp="1"/>
+          </p:cNvSpPr>
+          <p:nvPr>
+            <p:ph sz="quarter" idx="13"/>
+          </p:nvPr>
+        </p:nvSpPr>
+        <p:spPr>
+          <a:xfrm>
+            <a:off x="1615907" y="2096468"/>
+            <a:ext cx="6400800" cy="4507531"/>
+          </a:xfrm>
+        </p:spPr>
+        <p:txBody>
+          <a:bodyPr/>
+          <a:lstStyle/>
+          <a:p>
+            <a:pPr marL="45720" indent="0">
+              <a:buNone/>
+            </a:pPr>
+            <a:r>
+              <a:rPr lang="de-DE" dirty="0" smtClean="0"/>
+              <a:t>Vorhandene Objekte:</a:t>
+            </a:r>
+          </a:p>
+          <a:p>
+            <a:pPr marL="45720" indent="0">
+              <a:buNone/>
+            </a:pPr>
+            <a:r>
+              <a:rPr lang="de-DE" dirty="0" smtClean="0"/>
+              <a:t>-Inseln</a:t>
+            </a:r>
+          </a:p>
+          <a:p>
+            <a:pPr marL="45720" indent="0">
+              <a:buNone/>
+            </a:pPr>
+            <a:r>
+              <a:rPr lang="de-DE" dirty="0" smtClean="0"/>
+              <a:t>-Affe</a:t>
+            </a:r>
+          </a:p>
+          <a:p>
+            <a:pPr marL="45720" indent="0">
+              <a:buNone/>
+            </a:pPr>
+            <a:r>
+              <a:rPr lang="de-DE" dirty="0" smtClean="0"/>
+              <a:t>-Wasser</a:t>
+            </a:r>
+          </a:p>
+          <a:p>
+            <a:pPr marL="45720" indent="0">
+              <a:buNone/>
+            </a:pPr>
+            <a:endParaRPr lang="de-DE" dirty="0"/>
+          </a:p>
+          <a:p>
+            <a:pPr marL="45720" indent="0">
+              <a:buNone/>
+            </a:pPr>
+            <a:r>
+              <a:rPr lang="de-DE" dirty="0" smtClean="0"/>
+              <a:t>Nicht Vorhandene Objekte:</a:t>
+            </a:r>
+          </a:p>
+          <a:p>
+            <a:pPr marL="45720" indent="0">
+              <a:buNone/>
+            </a:pPr>
+            <a:r>
+              <a:rPr lang="de-DE" dirty="0" smtClean="0"/>
+              <a:t>Bananen-Baum</a:t>
+            </a:r>
+          </a:p>
+          <a:p>
+            <a:pPr marL="45720" indent="0">
+              <a:buNone/>
+            </a:pPr>
+            <a:r>
+              <a:rPr lang="de-DE" smtClean="0"/>
+              <a:t>Banane</a:t>
+            </a:r>
+          </a:p>
+          <a:p>
+            <a:pPr marL="45720" indent="0">
+              <a:buNone/>
+            </a:pPr>
+            <a:endParaRPr lang="de-DE" dirty="0"/>
+          </a:p>
+        </p:txBody>
+      </p:sp>
+    </p:spTree>
+    <p:extLst>
+      <p:ext uri="{BB962C8B-B14F-4D97-AF65-F5344CB8AC3E}">
+        <p14:creationId xmlns:p14="http://schemas.microsoft.com/office/powerpoint/2010/main" val="896897609"/>
+      </p:ext>
+    </p:extLst>
+  </p:cSld>
+  <p:clrMapOvr>
+    <a:masterClrMapping/>
+  </p:clrMapOvr>
+</p:sld>
+</file>
+
+<file path=ppt/slides/slide14.xml><?xml version="1.0" encoding="utf-8"?>
+<p:sld xmlns:a="http://schemas.openxmlformats.org/drawingml/2006/main" xmlns:r="http://schemas.openxmlformats.org/officeDocument/2006/relationships" xmlns:p="http://schemas.openxmlformats.org/presentationml/2006/main">
+  <p:cSld>
+    <p:spTree>
+      <p:nvGrpSpPr>
+        <p:cNvPr id="1" name=""/>
+        <p:cNvGrpSpPr/>
+        <p:nvPr/>
+      </p:nvGrpSpPr>
+      <p:grpSpPr>
+        <a:xfrm>
+          <a:off x="0" y="0"/>
+          <a:ext cx="0" cy="0"/>
+          <a:chOff x="0" y="0"/>
+          <a:chExt cx="0" cy="0"/>
+        </a:xfrm>
+      </p:grpSpPr>
+      <p:sp>
+        <p:nvSpPr>
+          <p:cNvPr id="2" name="Titel 1"/>
+          <p:cNvSpPr>
+            <a:spLocks noGrp="1"/>
+          </p:cNvSpPr>
+          <p:nvPr>
+            <p:ph type="title"/>
+          </p:nvPr>
+        </p:nvSpPr>
+        <p:spPr>
+          <a:xfrm>
+            <a:off x="1615907" y="535336"/>
+            <a:ext cx="6512511" cy="1143000"/>
+          </a:xfrm>
+        </p:spPr>
+        <p:txBody>
+          <a:bodyPr/>
+          <a:lstStyle/>
+          <a:p>
+            <a:pPr marL="0" indent="0" algn="ctr">
+              <a:buNone/>
+            </a:pPr>
+            <a:r>
+              <a:rPr lang="de-DE" dirty="0" smtClean="0"/>
+              <a:t>Zeitplan</a:t>
+            </a:r>
+            <a:endParaRPr lang="de-DE" dirty="0"/>
+          </a:p>
+        </p:txBody>
+      </p:sp>
+      <p:sp>
+        <p:nvSpPr>
+          <p:cNvPr id="3" name="Inhaltsplatzhalter 2"/>
+          <p:cNvSpPr>
+            <a:spLocks noGrp="1"/>
+          </p:cNvSpPr>
+          <p:nvPr>
+            <p:ph sz="quarter" idx="13"/>
+          </p:nvPr>
+        </p:nvSpPr>
+        <p:spPr>
+          <a:xfrm>
+            <a:off x="1615907" y="2096469"/>
+            <a:ext cx="6400800" cy="3474720"/>
+          </a:xfrm>
+        </p:spPr>
+        <p:txBody>
+          <a:bodyPr/>
+          <a:lstStyle/>
+          <a:p>
+            <a:pPr marL="45720" indent="0">
+              <a:buNone/>
+            </a:pPr>
+            <a:r>
+              <a:rPr lang="de-DE" dirty="0" smtClean="0"/>
+              <a:t>1 Woche: Modelle fertigstellen</a:t>
+            </a:r>
+          </a:p>
+          <a:p>
+            <a:pPr marL="45720" indent="0">
+              <a:buNone/>
+            </a:pPr>
+            <a:endParaRPr lang="de-DE" dirty="0"/>
+          </a:p>
+          <a:p>
+            <a:pPr marL="45720" indent="0">
+              <a:buNone/>
+            </a:pPr>
+            <a:r>
+              <a:rPr lang="de-DE" dirty="0" smtClean="0"/>
+              <a:t>2 Woche: Kameraführung/Licht </a:t>
+            </a:r>
+            <a:r>
+              <a:rPr lang="de-DE" dirty="0"/>
+              <a:t>und Schatten</a:t>
+            </a:r>
+          </a:p>
+          <a:p>
+            <a:pPr marL="45720" indent="0">
+              <a:buNone/>
+            </a:pPr>
+            <a:endParaRPr lang="de-DE" dirty="0"/>
+          </a:p>
+          <a:p>
+            <a:pPr marL="45720" indent="0">
+              <a:buNone/>
+            </a:pPr>
+            <a:r>
+              <a:rPr lang="de-DE" dirty="0" smtClean="0"/>
+              <a:t>3 Woche: </a:t>
+            </a:r>
+            <a:r>
+              <a:rPr lang="de-DE" dirty="0" err="1" smtClean="0"/>
+              <a:t>Rigging</a:t>
+            </a:r>
+            <a:endParaRPr lang="de-DE" dirty="0" smtClean="0"/>
+          </a:p>
+          <a:p>
+            <a:pPr marL="45720" indent="0">
+              <a:buNone/>
+            </a:pPr>
+            <a:endParaRPr lang="de-DE" dirty="0" smtClean="0"/>
+          </a:p>
+          <a:p>
+            <a:pPr marL="45720" indent="0">
+              <a:buNone/>
+            </a:pPr>
+            <a:r>
+              <a:rPr lang="de-DE" dirty="0" smtClean="0"/>
+              <a:t>4 Woche: Rendern</a:t>
+            </a:r>
+            <a:endParaRPr lang="de-DE" dirty="0"/>
+          </a:p>
+        </p:txBody>
+      </p:sp>
+    </p:spTree>
+    <p:extLst>
+      <p:ext uri="{BB962C8B-B14F-4D97-AF65-F5344CB8AC3E}">
+        <p14:creationId xmlns:p14="http://schemas.microsoft.com/office/powerpoint/2010/main" val="2296966588"/>
+      </p:ext>
+    </p:extLst>
+  </p:cSld>
+  <p:clrMapOvr>
+    <a:masterClrMapping/>
+  </p:clrMapOvr>
+</p:sld>
+</file>
+
+<file path=ppt/slides/slide15.xml><?xml version="1.0" encoding="utf-8"?>
+<p:sld xmlns:a="http://schemas.openxmlformats.org/drawingml/2006/main" xmlns:r="http://schemas.openxmlformats.org/officeDocument/2006/relationships" xmlns:p="http://schemas.openxmlformats.org/presentationml/2006/main">
+  <p:cSld>
+    <p:spTree>
+      <p:nvGrpSpPr>
+        <p:cNvPr id="1" name=""/>
+        <p:cNvGrpSpPr/>
+        <p:nvPr/>
+      </p:nvGrpSpPr>
+      <p:grpSpPr>
+        <a:xfrm>
+          <a:off x="0" y="0"/>
+          <a:ext cx="0" cy="0"/>
+          <a:chOff x="0" y="0"/>
+          <a:chExt cx="0" cy="0"/>
+        </a:xfrm>
+      </p:grpSpPr>
+      <p:sp>
+        <p:nvSpPr>
+          <p:cNvPr id="2" name="Titel 1"/>
+          <p:cNvSpPr>
+            <a:spLocks noGrp="1"/>
+          </p:cNvSpPr>
+          <p:nvPr>
+            <p:ph type="title"/>
+          </p:nvPr>
+        </p:nvSpPr>
+        <p:spPr>
+          <a:xfrm>
+            <a:off x="1306870" y="454276"/>
+            <a:ext cx="6512511" cy="1143000"/>
+          </a:xfrm>
+        </p:spPr>
+        <p:txBody>
+          <a:bodyPr/>
+          <a:lstStyle/>
+          <a:p>
+            <a:pPr marL="0" indent="0" algn="ctr">
+              <a:buNone/>
+            </a:pPr>
+            <a:r>
+              <a:rPr lang="de-DE" dirty="0" smtClean="0"/>
+              <a:t>Risiko</a:t>
+            </a:r>
+            <a:endParaRPr lang="de-DE" dirty="0"/>
+          </a:p>
+        </p:txBody>
+      </p:sp>
+      <p:sp>
+        <p:nvSpPr>
+          <p:cNvPr id="3" name="Inhaltsplatzhalter 2"/>
+          <p:cNvSpPr>
+            <a:spLocks noGrp="1"/>
+          </p:cNvSpPr>
+          <p:nvPr>
+            <p:ph sz="quarter" idx="13"/>
+          </p:nvPr>
+        </p:nvSpPr>
+        <p:spPr>
+          <a:xfrm>
+            <a:off x="1306870" y="2136557"/>
+            <a:ext cx="6400800" cy="3474720"/>
+          </a:xfrm>
+        </p:spPr>
+        <p:txBody>
+          <a:bodyPr/>
+          <a:lstStyle/>
+          <a:p>
+            <a:pPr>
+              <a:buFontTx/>
+              <a:buChar char="-"/>
+            </a:pPr>
+            <a:r>
+              <a:rPr lang="de-DE" dirty="0" smtClean="0"/>
+              <a:t>Zuviel Zeit in die Animation einplant, dann mit dem Rendern nicht nach kommt</a:t>
+            </a:r>
+          </a:p>
+          <a:p>
+            <a:pPr>
+              <a:buFontTx/>
+              <a:buChar char="-"/>
+            </a:pPr>
+            <a:endParaRPr lang="de-DE" dirty="0"/>
+          </a:p>
+          <a:p>
+            <a:pPr>
+              <a:buFontTx/>
+              <a:buChar char="-"/>
+            </a:pPr>
+            <a:r>
+              <a:rPr lang="de-DE" dirty="0" smtClean="0"/>
+              <a:t>Übermut zu viele Szenen </a:t>
+            </a:r>
+          </a:p>
+          <a:p>
+            <a:pPr>
+              <a:buFontTx/>
+              <a:buChar char="-"/>
+            </a:pPr>
+            <a:endParaRPr lang="de-DE" dirty="0"/>
+          </a:p>
+          <a:p>
+            <a:pPr>
+              <a:buFontTx/>
+              <a:buChar char="-"/>
+            </a:pPr>
+            <a:r>
+              <a:rPr lang="de-DE" dirty="0" smtClean="0"/>
+              <a:t>Falls gerenderte Szene am Ende nicht gut genug ist</a:t>
+            </a:r>
+          </a:p>
+        </p:txBody>
+      </p:sp>
+    </p:spTree>
+    <p:extLst>
+      <p:ext uri="{BB962C8B-B14F-4D97-AF65-F5344CB8AC3E}">
+        <p14:creationId xmlns:p14="http://schemas.microsoft.com/office/powerpoint/2010/main" val="2744394679"/>
+      </p:ext>
+    </p:extLst>
+  </p:cSld>
+  <p:clrMapOvr>
+    <a:masterClrMapping/>
+  </p:clrMapOvr>
+</p:sld>
+</file>
+
+<file path=ppt/slides/slide16.xml><?xml version="1.0" encoding="utf-8"?>
+<p:sld xmlns:a="http://schemas.openxmlformats.org/drawingml/2006/main" xmlns:r="http://schemas.openxmlformats.org/officeDocument/2006/relationships" xmlns:p="http://schemas.openxmlformats.org/presentationml/2006/main">
+  <p:cSld>
+    <p:spTree>
+      <p:nvGrpSpPr>
+        <p:cNvPr id="1" name=""/>
+        <p:cNvGrpSpPr/>
+        <p:nvPr/>
+      </p:nvGrpSpPr>
+      <p:grpSpPr>
+        <a:xfrm>
+          <a:off x="0" y="0"/>
+          <a:ext cx="0" cy="0"/>
+          <a:chOff x="0" y="0"/>
+          <a:chExt cx="0" cy="0"/>
+        </a:xfrm>
+      </p:grpSpPr>
+      <p:sp>
+        <p:nvSpPr>
+          <p:cNvPr id="2" name="Titel 1"/>
+          <p:cNvSpPr>
+            <a:spLocks noGrp="1"/>
+          </p:cNvSpPr>
+          <p:nvPr>
+            <p:ph type="title"/>
+          </p:nvPr>
+        </p:nvSpPr>
+        <p:spPr>
+          <a:xfrm>
             <a:off x="1344268" y="280137"/>
             <a:ext cx="6512511" cy="1143000"/>
           </a:xfrm>
@@ -5599,7 +6031,7 @@
 </p:sld>
 </file>
 
-<file path=ppt/slides/slide14.xml><?xml version="1.0" encoding="utf-8"?>
+<file path=ppt/slides/slide17.xml><?xml version="1.0" encoding="utf-8"?>
 <p:sld xmlns:a="http://schemas.openxmlformats.org/drawingml/2006/main" xmlns:r="http://schemas.openxmlformats.org/officeDocument/2006/relationships" xmlns:p="http://schemas.openxmlformats.org/presentationml/2006/main">
   <p:cSld>
     <p:spTree>
@@ -5809,7 +6241,6 @@
               <a:rPr lang="de-DE" dirty="0"/>
               <a:t>Doch der Affe hat Angst auf den Bananenbaum zu steigen, wie schafft Yoko es eine Banane zu ergattern??</a:t>
             </a:r>
-            <a:endParaRPr lang="de-DE" dirty="0"/>
           </a:p>
         </p:txBody>
       </p:sp>
@@ -5952,7 +6383,6 @@
               <a:rPr lang="de-DE" dirty="0"/>
               <a:t>sichtbar verwirrt.</a:t>
             </a:r>
-            <a:endParaRPr lang="de-DE" dirty="0"/>
           </a:p>
         </p:txBody>
       </p:sp>
@@ -6123,7 +6553,6 @@
               <a:rPr lang="de-DE" dirty="0"/>
               <a:t>nach rechts. </a:t>
             </a:r>
-            <a:endParaRPr lang="de-DE" dirty="0"/>
           </a:p>
         </p:txBody>
       </p:sp>
@@ -6308,13 +6737,12 @@
               <a:rPr lang="de-DE" dirty="0"/>
               <a:t>und einige Vögeln.</a:t>
             </a:r>
-            <a:endParaRPr lang="de-DE" dirty="0"/>
           </a:p>
         </p:txBody>
       </p:sp>
       <p:pic>
         <p:nvPicPr>
-          <p:cNvPr id="5" name="Bild 4" descr="Bild2.jpg"/>
+          <p:cNvPr id="4" name="Bild 3" descr="Bild3.jpg"/>
           <p:cNvPicPr>
             <a:picLocks noChangeAspect="1"/>
           </p:cNvPicPr>
@@ -6334,8 +6762,8 @@
         </p:blipFill>
         <p:spPr>
           <a:xfrm>
-            <a:off x="1067419" y="1935243"/>
-            <a:ext cx="4141893" cy="3171527"/>
+            <a:off x="997968" y="2104425"/>
+            <a:ext cx="4325617" cy="3358030"/>
           </a:xfrm>
           <a:prstGeom prst="rect">
             <a:avLst/>

</xml_diff>